<commit_message>
Uploading last iterative update on the literate review for the night. Uploading previous SJSU student's thesis on jigsaw puzzle problem. Uploading the updated BibTex file.
</commit_message>
<xml_diff>
--- a/Papers/Zayd_Hammoudeh_-_Square_Jigsaw_Puzzle_Problem_Literature_Review.pptx
+++ b/Papers/Zayd_Hammoudeh_-_Square_Jigsaw_Puzzle_Problem_Literature_Review.pptx
@@ -5,7 +5,7 @@
     <p:sldMasterId id="2147483751" r:id="rId1"/>
   </p:sldMasterIdLst>
   <p:notesMasterIdLst>
-    <p:notesMasterId r:id="rId29"/>
+    <p:notesMasterId r:id="rId35"/>
   </p:notesMasterIdLst>
   <p:sldIdLst>
     <p:sldId id="256" r:id="rId2"/>
@@ -22,19 +22,25 @@
     <p:sldId id="309" r:id="rId13"/>
     <p:sldId id="327" r:id="rId14"/>
     <p:sldId id="310" r:id="rId15"/>
-    <p:sldId id="306" r:id="rId16"/>
-    <p:sldId id="313" r:id="rId17"/>
-    <p:sldId id="314" r:id="rId18"/>
-    <p:sldId id="315" r:id="rId19"/>
-    <p:sldId id="316" r:id="rId20"/>
-    <p:sldId id="317" r:id="rId21"/>
-    <p:sldId id="318" r:id="rId22"/>
-    <p:sldId id="320" r:id="rId23"/>
-    <p:sldId id="321" r:id="rId24"/>
-    <p:sldId id="312" r:id="rId25"/>
-    <p:sldId id="303" r:id="rId26"/>
-    <p:sldId id="305" r:id="rId27"/>
-    <p:sldId id="319" r:id="rId28"/>
+    <p:sldId id="333" r:id="rId16"/>
+    <p:sldId id="334" r:id="rId17"/>
+    <p:sldId id="335" r:id="rId18"/>
+    <p:sldId id="318" r:id="rId19"/>
+    <p:sldId id="306" r:id="rId20"/>
+    <p:sldId id="313" r:id="rId21"/>
+    <p:sldId id="314" r:id="rId22"/>
+    <p:sldId id="315" r:id="rId23"/>
+    <p:sldId id="316" r:id="rId24"/>
+    <p:sldId id="317" r:id="rId25"/>
+    <p:sldId id="320" r:id="rId26"/>
+    <p:sldId id="330" r:id="rId27"/>
+    <p:sldId id="331" r:id="rId28"/>
+    <p:sldId id="332" r:id="rId29"/>
+    <p:sldId id="321" r:id="rId30"/>
+    <p:sldId id="312" r:id="rId31"/>
+    <p:sldId id="303" r:id="rId32"/>
+    <p:sldId id="305" r:id="rId33"/>
+    <p:sldId id="319" r:id="rId34"/>
   </p:sldIdLst>
   <p:sldSz cx="9144000" cy="6858000" type="screen4x3"/>
   <p:notesSz cx="6858000" cy="9144000"/>
@@ -1942,7 +1948,24 @@
                   <a:schemeClr val="tx1"/>
                 </a:solidFill>
               </a:rPr>
-              <a:t>(zayd.hammoudeh@sjsu.edu)</a:t>
+              <a:t>(</a:t>
+            </a:r>
+            <a:r>
+              <a:rPr lang="en-US" dirty="0" smtClean="0">
+                <a:solidFill>
+                  <a:schemeClr val="tx1"/>
+                </a:solidFill>
+                <a:hlinkClick r:id="rId2"/>
+              </a:rPr>
+              <a:t>zayd.hammoudeh@sjsu.edu</a:t>
+            </a:r>
+            <a:r>
+              <a:rPr lang="en-US" dirty="0" smtClean="0">
+                <a:solidFill>
+                  <a:schemeClr val="tx1"/>
+                </a:solidFill>
+              </a:rPr>
+              <a:t>)</a:t>
             </a:r>
             <a:endParaRPr lang="en-US" dirty="0">
               <a:solidFill>
@@ -5152,23 +5175,63 @@
             <p:ph idx="1"/>
           </p:nvPr>
         </p:nvSpPr>
-        <p:spPr/>
+        <p:spPr>
+          <a:xfrm>
+            <a:off x="314325" y="989013"/>
+            <a:ext cx="8639175" cy="5135562"/>
+          </a:xfrm>
+        </p:spPr>
         <p:txBody>
-          <a:bodyPr/>
+          <a:bodyPr>
+            <a:normAutofit fontScale="92500" lnSpcReduction="20000"/>
+          </a:bodyPr>
           <a:lstStyle/>
           <a:p>
-            <a:r>
-              <a:rPr lang="en-US" dirty="0" smtClean="0"/>
-              <a:t>Low Resolution “Solution Image” [8]</a:t>
-            </a:r>
-          </a:p>
-          <a:p>
+            <a:pPr>
+              <a:lnSpc>
+                <a:spcPct val="120000"/>
+              </a:lnSpc>
+              <a:spcBef>
+                <a:spcPts val="1800"/>
+              </a:spcBef>
+            </a:pPr>
             <a:r>
               <a:rPr lang="en-US" dirty="0" smtClean="0"/>
               <a:t>Dynamic Programming and the “Hungarian” Procedure [13]</a:t>
             </a:r>
           </a:p>
           <a:p>
+            <a:pPr>
+              <a:lnSpc>
+                <a:spcPct val="120000"/>
+              </a:lnSpc>
+              <a:spcBef>
+                <a:spcPts val="1800"/>
+              </a:spcBef>
+            </a:pPr>
+            <a:r>
+              <a:rPr lang="en-US" dirty="0" smtClean="0"/>
+              <a:t>Patch Transform using a Low Resolution “Solution </a:t>
+            </a:r>
+            <a:r>
+              <a:rPr lang="en-US" dirty="0"/>
+              <a:t>Image” [8</a:t>
+            </a:r>
+            <a:r>
+              <a:rPr lang="en-US" dirty="0" smtClean="0"/>
+              <a:t>]</a:t>
+            </a:r>
+            <a:endParaRPr lang="en-US" dirty="0" smtClean="0"/>
+          </a:p>
+          <a:p>
+            <a:pPr>
+              <a:lnSpc>
+                <a:spcPct val="120000"/>
+              </a:lnSpc>
+              <a:spcBef>
+                <a:spcPts val="1800"/>
+              </a:spcBef>
+            </a:pPr>
             <a:r>
               <a:rPr lang="en-US" dirty="0" smtClean="0"/>
               <a:t>“</a:t>
@@ -5187,12 +5250,28 @@
             </a:r>
           </a:p>
           <a:p>
+            <a:pPr>
+              <a:lnSpc>
+                <a:spcPct val="120000"/>
+              </a:lnSpc>
+              <a:spcBef>
+                <a:spcPts val="1800"/>
+              </a:spcBef>
+            </a:pPr>
             <a:r>
               <a:rPr lang="en-US" dirty="0" smtClean="0"/>
               <a:t>Particle Filter-Based Solver [11]</a:t>
             </a:r>
           </a:p>
           <a:p>
+            <a:pPr>
+              <a:lnSpc>
+                <a:spcPct val="120000"/>
+              </a:lnSpc>
+              <a:spcBef>
+                <a:spcPts val="1800"/>
+              </a:spcBef>
+            </a:pPr>
             <a:r>
               <a:rPr lang="en-US" dirty="0" smtClean="0"/>
               <a:t>Greedy </a:t>
@@ -5203,6 +5282,14 @@
             </a:r>
           </a:p>
           <a:p>
+            <a:pPr>
+              <a:lnSpc>
+                <a:spcPct val="120000"/>
+              </a:lnSpc>
+              <a:spcBef>
+                <a:spcPts val="1800"/>
+              </a:spcBef>
+            </a:pPr>
             <a:r>
               <a:rPr lang="en-US" dirty="0" smtClean="0"/>
               <a:t>Genetic Algorithm [9</a:t>
@@ -5213,16 +5300,39 @@
             </a:r>
           </a:p>
           <a:p>
-            <a:endParaRPr lang="en-US" dirty="0"/>
-          </a:p>
-          <a:p>
-            <a:r>
-              <a:rPr lang="en-US" dirty="0" smtClean="0"/>
+            <a:pPr>
+              <a:lnSpc>
+                <a:spcPct val="120000"/>
+              </a:lnSpc>
+              <a:spcBef>
+                <a:spcPts val="1800"/>
+              </a:spcBef>
+            </a:pPr>
+            <a:endParaRPr lang="en-US" sz="500" dirty="0"/>
+          </a:p>
+          <a:p>
+            <a:pPr>
+              <a:lnSpc>
+                <a:spcPct val="120000"/>
+              </a:lnSpc>
+              <a:spcBef>
+                <a:spcPts val="1800"/>
+              </a:spcBef>
+            </a:pPr>
+            <a:r>
+              <a:rPr lang="en-US" b="1" dirty="0" smtClean="0"/>
               <a:t>Variations of the Problem</a:t>
             </a:r>
           </a:p>
           <a:p>
-            <a:pPr lvl="1"/>
+            <a:pPr lvl="1">
+              <a:lnSpc>
+                <a:spcPct val="120000"/>
+              </a:lnSpc>
+              <a:spcBef>
+                <a:spcPts val="1800"/>
+              </a:spcBef>
+            </a:pPr>
             <a:r>
               <a:rPr lang="en-US" dirty="0" smtClean="0"/>
               <a:t>Unknown orientation (i.e. rotation) and puzzle dimensions [12]</a:t>
@@ -5281,150 +5391,154 @@
         <p:spPr/>
         <p:txBody>
           <a:bodyPr>
-            <a:normAutofit/>
+            <a:normAutofit fontScale="90000"/>
           </a:bodyPr>
           <a:lstStyle/>
           <a:p>
             <a:r>
-              <a:rPr lang="en-US" sz="2800" dirty="0" smtClean="0"/>
-              <a:t>“Dense and Noisy” Estimation</a:t>
-            </a:r>
-            <a:endParaRPr lang="en-US" sz="2800" dirty="0"/>
+              <a:rPr lang="en-US" dirty="0" smtClean="0"/>
+              <a:t>Patch Transform</a:t>
+            </a:r>
+            <a:endParaRPr lang="en-US" dirty="0"/>
           </a:p>
         </p:txBody>
       </p:sp>
-      <mc:AlternateContent xmlns:mc="http://schemas.openxmlformats.org/markup-compatibility/2006">
-        <mc:Choice xmlns:a14="http://schemas.microsoft.com/office/drawing/2010/main" Requires="a14">
-          <p:sp>
-            <p:nvSpPr>
-              <p:cNvPr id="3" name="Content Placeholder 2"/>
-              <p:cNvSpPr>
-                <a:spLocks noGrp="1"/>
-              </p:cNvSpPr>
-              <p:nvPr>
-                <p:ph idx="1"/>
-              </p:nvPr>
-            </p:nvSpPr>
-            <p:spPr/>
-            <p:txBody>
-              <a:bodyPr/>
-              <a:lstStyle/>
-              <a:p>
-                <a:r>
-                  <a:rPr lang="en-US" dirty="0" smtClean="0"/>
-                  <a:t>Proposed by Cho et. al. in [7] in 2010.</a:t>
-                </a:r>
-                <a:endParaRPr lang="en-US" dirty="0" smtClean="0"/>
-              </a:p>
-              <a:p>
-                <a:endParaRPr lang="en-US" dirty="0" smtClean="0"/>
-              </a:p>
-              <a:p>
-                <a:r>
-                  <a:rPr lang="en-US" b="1" dirty="0" smtClean="0"/>
-                  <a:t>Overview: </a:t>
-                </a:r>
-                <a:r>
-                  <a:rPr lang="en-US" dirty="0" smtClean="0"/>
-                  <a:t>In Cho et. al.’s work in [8], they assumed access to a correct, low resolution version of the original image.</a:t>
-                </a:r>
-              </a:p>
-              <a:p>
-                <a:pPr lvl="1"/>
-                <a:r>
-                  <a:rPr lang="en-US" dirty="0" smtClean="0"/>
-                  <a:t>In many real world applications, such a low resolution image is not available.</a:t>
-                </a:r>
-              </a:p>
-              <a:p>
-                <a:endParaRPr lang="en-US" dirty="0" smtClean="0"/>
-              </a:p>
-              <a:p>
-                <a:r>
-                  <a:rPr lang="en-US" b="1" dirty="0" smtClean="0"/>
-                  <a:t>Solution:</a:t>
-                </a:r>
-                <a:r>
-                  <a:rPr lang="en-US" dirty="0" smtClean="0"/>
-                  <a:t> Estimate a low resolution image from a “bag of patches.”  The simplified procedure is:</a:t>
-                </a:r>
-              </a:p>
-              <a:p>
-                <a:pPr lvl="1"/>
-                <a:r>
-                  <a:rPr lang="en-US" dirty="0" smtClean="0"/>
-                  <a:t>Creating a histogram of the bag of patches</a:t>
-                </a:r>
-              </a:p>
-              <a:p>
-                <a:pPr lvl="1"/>
-                <a:r>
-                  <a:rPr lang="en-US" dirty="0" smtClean="0"/>
-                  <a:t>“Estimate” a low resolution version by comparing the histogram to a set of </a:t>
-                </a:r>
-                <a14:m>
-                  <m:oMath xmlns:m="http://schemas.openxmlformats.org/officeDocument/2006/math">
-                    <m:r>
-                      <a:rPr lang="en-US" b="0" i="1" smtClean="0">
-                        <a:latin typeface="Cambria Math"/>
-                      </a:rPr>
-                      <m:t>𝐾</m:t>
-                    </m:r>
-                  </m:oMath>
-                </a14:m>
-                <a:r>
-                  <a:rPr lang="en-US" dirty="0" smtClean="0"/>
-                  <a:t> centroids with predefined low resolution images.</a:t>
-                </a:r>
-              </a:p>
-              <a:p>
-                <a:pPr lvl="1"/>
-                <a:endParaRPr lang="en-US" dirty="0" smtClean="0"/>
-              </a:p>
-              <a:p>
-                <a:endParaRPr lang="en-US" dirty="0"/>
-              </a:p>
-            </p:txBody>
-          </p:sp>
-        </mc:Choice>
-        <mc:Fallback>
-          <p:sp>
-            <p:nvSpPr>
-              <p:cNvPr id="3" name="Content Placeholder 2"/>
-              <p:cNvSpPr>
-                <a:spLocks noGrp="1" noRot="1" noChangeAspect="1" noMove="1" noResize="1" noEditPoints="1" noAdjustHandles="1" noChangeArrowheads="1" noChangeShapeType="1" noTextEdit="1"/>
-              </p:cNvSpPr>
-              <p:nvPr>
-                <p:ph idx="1"/>
-              </p:nvPr>
-            </p:nvSpPr>
-            <p:spPr>
-              <a:blipFill rotWithShape="1">
-                <a:blip r:embed="rId2"/>
-                <a:stretch>
-                  <a:fillRect l="-963" t="-949" r="-1333"/>
-                </a:stretch>
-              </a:blipFill>
-            </p:spPr>
-            <p:txBody>
-              <a:bodyPr/>
-              <a:lstStyle/>
-              <a:p>
-                <a:r>
-                  <a:rPr lang="en-US">
-                    <a:noFill/>
-                  </a:rPr>
-                  <a:t> </a:t>
-                </a:r>
-              </a:p>
-            </p:txBody>
-          </p:sp>
-        </mc:Fallback>
-      </mc:AlternateContent>
+      <p:sp>
+        <p:nvSpPr>
+          <p:cNvPr id="3" name="Content Placeholder 2"/>
+          <p:cNvSpPr>
+            <a:spLocks noGrp="1"/>
+          </p:cNvSpPr>
+          <p:nvPr>
+            <p:ph idx="1"/>
+          </p:nvPr>
+        </p:nvSpPr>
+        <p:spPr/>
+        <p:txBody>
+          <a:bodyPr>
+            <a:normAutofit fontScale="92500" lnSpcReduction="20000"/>
+          </a:bodyPr>
+          <a:lstStyle/>
+          <a:p>
+            <a:pPr>
+              <a:lnSpc>
+                <a:spcPct val="130000"/>
+              </a:lnSpc>
+            </a:pPr>
+            <a:r>
+              <a:rPr lang="en-US" dirty="0" smtClean="0"/>
+              <a:t>Introduced by Cho et. al. in [8]</a:t>
+            </a:r>
+          </a:p>
+          <a:p>
+            <a:pPr>
+              <a:lnSpc>
+                <a:spcPct val="130000"/>
+              </a:lnSpc>
+            </a:pPr>
+            <a:endParaRPr lang="en-US" sz="1200" dirty="0"/>
+          </a:p>
+          <a:p>
+            <a:pPr>
+              <a:lnSpc>
+                <a:spcPct val="130000"/>
+              </a:lnSpc>
+            </a:pPr>
+            <a:r>
+              <a:rPr lang="en-US" b="1" dirty="0" smtClean="0"/>
+              <a:t>Overview of the Patch Transform</a:t>
+            </a:r>
+            <a:r>
+              <a:rPr lang="en-US" dirty="0" smtClean="0"/>
+              <a:t>: Segment a source image into a set of non-overlapping “patches” and rearrange these patches  and reorganize the image in the “patch” domain.</a:t>
+            </a:r>
+          </a:p>
+          <a:p>
+            <a:pPr lvl="1">
+              <a:lnSpc>
+                <a:spcPct val="130000"/>
+              </a:lnSpc>
+            </a:pPr>
+            <a:r>
+              <a:rPr lang="en-US" i="1" dirty="0" smtClean="0"/>
+              <a:t>Intended Usage</a:t>
+            </a:r>
+            <a:r>
+              <a:rPr lang="en-US" dirty="0" smtClean="0"/>
+              <a:t>: Image editing</a:t>
+            </a:r>
+          </a:p>
+          <a:p>
+            <a:pPr>
+              <a:lnSpc>
+                <a:spcPct val="130000"/>
+              </a:lnSpc>
+            </a:pPr>
+            <a:endParaRPr lang="en-US" sz="1200" dirty="0"/>
+          </a:p>
+          <a:p>
+            <a:pPr>
+              <a:lnSpc>
+                <a:spcPct val="130000"/>
+              </a:lnSpc>
+            </a:pPr>
+            <a:r>
+              <a:rPr lang="en-US" b="1" dirty="0" smtClean="0"/>
+              <a:t>“Inverse” Patch Transform</a:t>
+            </a:r>
+            <a:r>
+              <a:rPr lang="en-US" dirty="0" smtClean="0"/>
+              <a:t>: Reconstruct an image from a set of patches.  This requires two components:</a:t>
+            </a:r>
+          </a:p>
+          <a:p>
+            <a:pPr lvl="1">
+              <a:lnSpc>
+                <a:spcPct val="130000"/>
+              </a:lnSpc>
+            </a:pPr>
+            <a:r>
+              <a:rPr lang="en-US" dirty="0" smtClean="0"/>
+              <a:t>A patch compatibility function</a:t>
+            </a:r>
+          </a:p>
+          <a:p>
+            <a:pPr lvl="1">
+              <a:lnSpc>
+                <a:spcPct val="130000"/>
+              </a:lnSpc>
+            </a:pPr>
+            <a:r>
+              <a:rPr lang="en-US" dirty="0" smtClean="0"/>
+              <a:t>An algorithm that places all patches</a:t>
+            </a:r>
+          </a:p>
+          <a:p>
+            <a:pPr>
+              <a:lnSpc>
+                <a:spcPct val="130000"/>
+              </a:lnSpc>
+            </a:pPr>
+            <a:endParaRPr lang="en-US" sz="1200" dirty="0"/>
+          </a:p>
+          <a:p>
+            <a:pPr>
+              <a:lnSpc>
+                <a:spcPct val="130000"/>
+              </a:lnSpc>
+            </a:pPr>
+            <a:r>
+              <a:rPr lang="en-US" dirty="0" smtClean="0"/>
+              <a:t>Uses a provided low resolution image as part of the patch placement algorithm.</a:t>
+            </a:r>
+            <a:endParaRPr lang="en-US" dirty="0"/>
+          </a:p>
+        </p:txBody>
+      </p:sp>
     </p:spTree>
     <p:extLst>
       <p:ext uri="{BB962C8B-B14F-4D97-AF65-F5344CB8AC3E}">
-        <p14:creationId xmlns:p14="http://schemas.microsoft.com/office/powerpoint/2010/main" val="2946689892"/>
+        <p14:creationId xmlns:p14="http://schemas.microsoft.com/office/powerpoint/2010/main" val="2524356976"/>
       </p:ext>
     </p:extLst>
   </p:cSld>
@@ -5468,30 +5582,18 @@
             <p:ph type="title"/>
           </p:nvPr>
         </p:nvSpPr>
-        <p:spPr>
-          <a:xfrm>
-            <a:off x="1790700" y="127002"/>
-            <a:ext cx="7353300" cy="550863"/>
-          </a:xfrm>
-        </p:spPr>
+        <p:spPr/>
         <p:txBody>
           <a:bodyPr>
-            <a:noAutofit/>
+            <a:normAutofit fontScale="90000"/>
           </a:bodyPr>
           <a:lstStyle/>
           <a:p>
             <a:r>
-              <a:rPr lang="en-US" sz="2400" dirty="0" smtClean="0"/>
-              <a:t>“Dense and Noisy” Clustering </a:t>
-            </a:r>
-            <a:br>
-              <a:rPr lang="en-US" sz="2400" dirty="0" smtClean="0"/>
-            </a:br>
-            <a:r>
-              <a:rPr lang="en-US" sz="2400" dirty="0" smtClean="0"/>
-              <a:t>and Histogram Generation</a:t>
-            </a:r>
-            <a:endParaRPr lang="en-US" sz="2400" dirty="0"/>
+              <a:rPr lang="en-US" dirty="0" smtClean="0"/>
+              <a:t>Markov Random Field</a:t>
+            </a:r>
+            <a:endParaRPr lang="en-US" dirty="0"/>
           </a:p>
         </p:txBody>
       </p:sp>
@@ -5507,81 +5609,288 @@
                 <p:ph idx="1"/>
               </p:nvPr>
             </p:nvSpPr>
-            <p:spPr/>
+            <p:spPr>
+              <a:xfrm>
+                <a:off x="457200" y="989013"/>
+                <a:ext cx="8366760" cy="5135562"/>
+              </a:xfrm>
+            </p:spPr>
             <p:txBody>
-              <a:bodyPr/>
+              <a:bodyPr>
+                <a:normAutofit fontScale="92500" lnSpcReduction="20000"/>
+              </a:bodyPr>
               <a:lstStyle/>
               <a:p>
                 <a:pPr>
+                  <a:lnSpc>
+                    <a:spcPct val="120000"/>
+                  </a:lnSpc>
                   <a:spcBef>
-                    <a:spcPts val="1000"/>
+                    <a:spcPts val="1200"/>
                   </a:spcBef>
                 </a:pPr>
                 <a:r>
-                  <a:rPr lang="en-US" b="1" dirty="0" smtClean="0"/>
-                  <a:t>Training Set:</a:t>
-                </a:r>
-                <a:r>
                   <a:rPr lang="en-US" dirty="0" smtClean="0"/>
-                  <a:t> 8.5M patches from 15,000 images.</a:t>
+                  <a:t>Use a Markov Random Field (MRF) to enforce three rules:</a:t>
                 </a:r>
               </a:p>
               <a:p>
                 <a:pPr lvl="1">
+                  <a:lnSpc>
+                    <a:spcPct val="120000"/>
+                  </a:lnSpc>
                   <a:spcBef>
-                    <a:spcPts val="1000"/>
+                    <a:spcPts val="1200"/>
                   </a:spcBef>
                 </a:pPr>
                 <a:r>
-                  <a:rPr lang="en-US" i="1" dirty="0">
+                  <a:rPr lang="en-US" dirty="0" smtClean="0"/>
+                  <a:t>Adjacent pieces should fit plausibly together</a:t>
+                </a:r>
+              </a:p>
+              <a:p>
+                <a:pPr lvl="1">
+                  <a:lnSpc>
+                    <a:spcPct val="120000"/>
+                  </a:lnSpc>
+                  <a:spcBef>
+                    <a:spcPts val="1200"/>
+                  </a:spcBef>
+                </a:pPr>
+                <a:r>
+                  <a:rPr lang="en-US" dirty="0" smtClean="0"/>
+                  <a:t>A patch should “</a:t>
+                </a:r>
+                <a:r>
+                  <a:rPr lang="en-US" i="1" dirty="0" smtClean="0">
                     <a:solidFill>
                       <a:srgbClr val="006600"/>
                     </a:solidFill>
                   </a:rPr>
-                  <a:t>Patch Size: </a:t>
+                  <a:t>never</a:t>
                 </a:r>
                 <a:r>
                   <a:rPr lang="en-US" dirty="0" smtClean="0"/>
-                  <a:t>7px by 7px by 3 (LAB) for 147 total, original dimensions.  This dimensionality is reduced via PCA.</a:t>
-                </a:r>
-              </a:p>
-              <a:p>
-                <a:pPr marL="457200" lvl="1" indent="0">
-                  <a:spcBef>
-                    <a:spcPts val="1000"/>
-                  </a:spcBef>
-                  <a:buNone/>
-                </a:pPr>
-                <a:endParaRPr lang="en-US" dirty="0" smtClean="0"/>
-              </a:p>
-              <a:p>
-                <a:pPr>
-                  <a:spcBef>
-                    <a:spcPts val="1000"/>
-                  </a:spcBef>
-                </a:pPr>
-                <a:r>
-                  <a:rPr lang="en-US" b="1" dirty="0" smtClean="0"/>
-                  <a:t>Clustering the Patches</a:t>
-                </a:r>
-              </a:p>
-              <a:p>
-                <a:pPr lvl="1">
-                  <a:spcBef>
-                    <a:spcPts val="1000"/>
-                  </a:spcBef>
-                </a:pPr>
-                <a:r>
-                  <a:rPr lang="en-US" i="1" dirty="0">
+                  <a:t>” (or in the loosened case “</a:t>
+                </a:r>
+                <a:r>
+                  <a:rPr lang="en-US" i="1" dirty="0" err="1" smtClean="0">
                     <a:solidFill>
                       <a:srgbClr val="006600"/>
                     </a:solidFill>
                   </a:rPr>
-                  <a:t>Step #1: </a:t>
+                  <a:t>seldomly</a:t>
                 </a:r>
                 <a:r>
                   <a:rPr lang="en-US" dirty="0" smtClean="0"/>
-                  <a:t>Cluster each image’s patches into </a:t>
+                  <a:t>”) be reused.</a:t>
+                </a:r>
+              </a:p>
+              <a:p>
+                <a:pPr lvl="1">
+                  <a:lnSpc>
+                    <a:spcPct val="120000"/>
+                  </a:lnSpc>
+                  <a:spcBef>
+                    <a:spcPts val="1200"/>
+                  </a:spcBef>
+                </a:pPr>
+                <a:r>
+                  <a:rPr lang="en-US" dirty="0" smtClean="0"/>
+                  <a:t>User constraints (e.g. board size) on patch placement.</a:t>
+                </a:r>
+              </a:p>
+              <a:p>
+                <a:pPr>
+                  <a:lnSpc>
+                    <a:spcPct val="120000"/>
+                  </a:lnSpc>
+                  <a:spcBef>
+                    <a:spcPts val="1200"/>
+                  </a:spcBef>
+                </a:pPr>
+                <a:endParaRPr lang="en-US" sz="500" dirty="0" smtClean="0"/>
+              </a:p>
+              <a:p>
+                <a:pPr>
+                  <a:lnSpc>
+                    <a:spcPct val="120000"/>
+                  </a:lnSpc>
+                  <a:spcBef>
+                    <a:spcPts val="1200"/>
+                  </a:spcBef>
+                </a:pPr>
+                <a:r>
+                  <a:rPr lang="en-US" dirty="0" smtClean="0"/>
+                  <a:t>Consider each possible patch location as a node in the MRF.  The key notation definitions:</a:t>
+                </a:r>
+              </a:p>
+              <a:p>
+                <a:pPr lvl="1">
+                  <a:lnSpc>
+                    <a:spcPct val="120000"/>
+                  </a:lnSpc>
+                  <a:spcBef>
+                    <a:spcPts val="1200"/>
+                  </a:spcBef>
+                </a:pPr>
+                <a14:m>
+                  <m:oMath xmlns:m="http://schemas.openxmlformats.org/officeDocument/2006/math">
+                    <m:sSub>
+                      <m:sSubPr>
+                        <m:ctrlPr>
+                          <a:rPr lang="en-US" b="0" i="1" smtClean="0">
+                            <a:latin typeface="Cambria Math"/>
+                          </a:rPr>
+                        </m:ctrlPr>
+                      </m:sSubPr>
+                      <m:e>
+                        <m:r>
+                          <a:rPr lang="en-US" b="0" i="1" smtClean="0">
+                            <a:latin typeface="Cambria Math"/>
+                          </a:rPr>
+                          <m:t>𝑥</m:t>
+                        </m:r>
+                      </m:e>
+                      <m:sub>
+                        <m:r>
+                          <a:rPr lang="en-US" b="0" i="1" smtClean="0">
+                            <a:latin typeface="Cambria Math"/>
+                          </a:rPr>
+                          <m:t>𝑖</m:t>
+                        </m:r>
+                      </m:sub>
+                    </m:sSub>
+                  </m:oMath>
+                </a14:m>
+                <a:r>
+                  <a:rPr lang="en-US" dirty="0"/>
+                  <a:t> – </a:t>
+                </a:r>
+                <a:r>
+                  <a:rPr lang="en-US" dirty="0" smtClean="0"/>
+                  <a:t>Undetermined state for the node </a:t>
+                </a:r>
+                <a14:m>
+                  <m:oMath xmlns:m="http://schemas.openxmlformats.org/officeDocument/2006/math">
+                    <m:sSup>
+                      <m:sSupPr>
+                        <m:ctrlPr>
+                          <a:rPr lang="en-US" b="0" i="1" smtClean="0">
+                            <a:latin typeface="Cambria Math"/>
+                          </a:rPr>
+                        </m:ctrlPr>
+                      </m:sSupPr>
+                      <m:e>
+                        <m:r>
+                          <a:rPr lang="en-US" b="0" i="1" smtClean="0">
+                            <a:latin typeface="Cambria Math"/>
+                          </a:rPr>
+                          <m:t>𝑖</m:t>
+                        </m:r>
+                      </m:e>
+                      <m:sup>
+                        <m:r>
+                          <a:rPr lang="en-US" b="0" i="1" smtClean="0">
+                            <a:latin typeface="Cambria Math"/>
+                          </a:rPr>
+                          <m:t>𝑡h</m:t>
+                        </m:r>
+                      </m:sup>
+                    </m:sSup>
+                  </m:oMath>
+                </a14:m>
+                <a:r>
+                  <a:rPr lang="en-US" dirty="0" smtClean="0"/>
+                  <a:t> in the MRF.</a:t>
+                </a:r>
+                <a:endParaRPr lang="en-US" b="0" i="1" dirty="0" smtClean="0">
+                  <a:latin typeface="Cambria Math"/>
+                </a:endParaRPr>
+              </a:p>
+              <a:p>
+                <a:pPr lvl="1">
+                  <a:lnSpc>
+                    <a:spcPct val="120000"/>
+                  </a:lnSpc>
+                  <a:spcBef>
+                    <a:spcPts val="1200"/>
+                  </a:spcBef>
+                </a:pPr>
+                <a14:m>
+                  <m:oMath xmlns:m="http://schemas.openxmlformats.org/officeDocument/2006/math">
+                    <m:sSub>
+                      <m:sSubPr>
+                        <m:ctrlPr>
+                          <a:rPr lang="en-US" b="0" i="1" smtClean="0">
+                            <a:latin typeface="Cambria Math"/>
+                          </a:rPr>
+                        </m:ctrlPr>
+                      </m:sSubPr>
+                      <m:e>
+                        <m:r>
+                          <a:rPr lang="en-US" b="0" i="1" smtClean="0">
+                            <a:latin typeface="Cambria Math"/>
+                          </a:rPr>
+                          <m:t>𝜓</m:t>
+                        </m:r>
+                      </m:e>
+                      <m:sub>
+                        <m:r>
+                          <a:rPr lang="en-US" b="0" i="1" smtClean="0">
+                            <a:latin typeface="Cambria Math"/>
+                          </a:rPr>
+                          <m:t>𝑖</m:t>
+                        </m:r>
+                        <m:r>
+                          <a:rPr lang="en-US" b="0" i="1" smtClean="0">
+                            <a:latin typeface="Cambria Math"/>
+                          </a:rPr>
+                          <m:t>,</m:t>
+                        </m:r>
+                        <m:r>
+                          <a:rPr lang="en-US" b="0" i="1" smtClean="0">
+                            <a:latin typeface="Cambria Math"/>
+                          </a:rPr>
+                          <m:t>𝑗</m:t>
+                        </m:r>
+                      </m:sub>
+                    </m:sSub>
+                    <m:r>
+                      <a:rPr lang="en-US" b="0" i="1" smtClean="0">
+                        <a:latin typeface="Cambria Math"/>
+                      </a:rPr>
+                      <m:t>(</m:t>
+                    </m:r>
+                    <m:r>
+                      <a:rPr lang="en-US" b="0" i="1" smtClean="0">
+                        <a:latin typeface="Cambria Math"/>
+                      </a:rPr>
+                      <m:t>𝑘</m:t>
+                    </m:r>
+                    <m:r>
+                      <a:rPr lang="en-US" b="0" i="1" smtClean="0">
+                        <a:latin typeface="Cambria Math"/>
+                      </a:rPr>
+                      <m:t>,</m:t>
+                    </m:r>
+                    <m:r>
+                      <a:rPr lang="en-US" b="0" i="1" smtClean="0">
+                        <a:latin typeface="Cambria Math"/>
+                      </a:rPr>
+                      <m:t>𝑙</m:t>
+                    </m:r>
+                    <m:r>
+                      <a:rPr lang="en-US" b="0" i="1" smtClean="0">
+                        <a:latin typeface="Cambria Math"/>
+                      </a:rPr>
+                      <m:t>)</m:t>
+                    </m:r>
+                  </m:oMath>
+                </a14:m>
+                <a:r>
+                  <a:rPr lang="en-US" dirty="0" smtClean="0"/>
+                  <a:t> – Compatibility between patches </a:t>
                 </a:r>
                 <a14:m>
                   <m:oMath xmlns:m="http://schemas.openxmlformats.org/officeDocument/2006/math">
@@ -5589,32 +5898,13 @@
                       <a:rPr lang="en-US" b="0" i="1" smtClean="0">
                         <a:latin typeface="Cambria Math"/>
                       </a:rPr>
-                      <m:t>𝐿</m:t>
+                      <m:t>𝑘</m:t>
                     </m:r>
                   </m:oMath>
                 </a14:m>
                 <a:r>
                   <a:rPr lang="en-US" dirty="0" smtClean="0"/>
-                  <a:t> (e.g. 20) centroids.</a:t>
-                </a:r>
-              </a:p>
-              <a:p>
-                <a:pPr lvl="1">
-                  <a:spcBef>
-                    <a:spcPts val="1000"/>
-                  </a:spcBef>
-                </a:pPr>
-                <a:r>
-                  <a:rPr lang="en-US" i="1" dirty="0" smtClean="0">
-                    <a:solidFill>
-                      <a:srgbClr val="006600"/>
-                    </a:solidFill>
-                  </a:rPr>
-                  <a:t>Step #2</a:t>
-                </a:r>
-                <a:r>
-                  <a:rPr lang="en-US" dirty="0" smtClean="0"/>
-                  <a:t>: Re-cluster </a:t>
+                  <a:t> and </a:t>
                 </a:r>
                 <a14:m>
                   <m:oMath xmlns:m="http://schemas.openxmlformats.org/officeDocument/2006/math">
@@ -5622,13 +5912,62 @@
                       <a:rPr lang="en-US" b="0" i="1" smtClean="0">
                         <a:latin typeface="Cambria Math"/>
                       </a:rPr>
-                      <m:t>𝐿</m:t>
+                      <m:t>𝑙</m:t>
                     </m:r>
                   </m:oMath>
                 </a14:m>
                 <a:r>
                   <a:rPr lang="en-US" dirty="0" smtClean="0"/>
-                  <a:t> centroids from all images into </a:t>
+                  <a:t> at adjacent MRF locations </a:t>
+                </a:r>
+                <a14:m>
+                  <m:oMath xmlns:m="http://schemas.openxmlformats.org/officeDocument/2006/math">
+                    <m:r>
+                      <a:rPr lang="en-US" b="0" i="1" smtClean="0">
+                        <a:latin typeface="Cambria Math"/>
+                      </a:rPr>
+                      <m:t>𝑖</m:t>
+                    </m:r>
+                  </m:oMath>
+                </a14:m>
+                <a:r>
+                  <a:rPr lang="en-US" dirty="0" smtClean="0"/>
+                  <a:t> and </a:t>
+                </a:r>
+                <a14:m>
+                  <m:oMath xmlns:m="http://schemas.openxmlformats.org/officeDocument/2006/math">
+                    <m:r>
+                      <a:rPr lang="en-US" b="0" i="1" smtClean="0">
+                        <a:latin typeface="Cambria Math"/>
+                      </a:rPr>
+                      <m:t>𝑗</m:t>
+                    </m:r>
+                  </m:oMath>
+                </a14:m>
+                <a:endParaRPr lang="en-US" b="0" dirty="0" smtClean="0"/>
+              </a:p>
+              <a:p>
+                <a:pPr lvl="1">
+                  <a:lnSpc>
+                    <a:spcPct val="120000"/>
+                  </a:lnSpc>
+                  <a:spcBef>
+                    <a:spcPts val="1200"/>
+                  </a:spcBef>
+                </a:pPr>
+                <a14:m>
+                  <m:oMath xmlns:m="http://schemas.openxmlformats.org/officeDocument/2006/math">
+                    <m:r>
+                      <a:rPr lang="en-US" b="0" i="1" smtClean="0">
+                        <a:latin typeface="Cambria Math"/>
+                      </a:rPr>
+                      <m:t>𝑋</m:t>
+                    </m:r>
+                  </m:oMath>
+                </a14:m>
+                <a:r>
+                  <a:rPr lang="en-US" dirty="0" smtClean="0"/>
+                  <a:t> – Vector of </a:t>
                 </a:r>
                 <a14:m>
                   <m:oMath xmlns:m="http://schemas.openxmlformats.org/officeDocument/2006/math">
@@ -5642,30 +5981,61 @@
                 </a14:m>
                 <a:r>
                   <a:rPr lang="en-US" dirty="0" smtClean="0"/>
-                  <a:t> (e.g. 200) centroids. </a:t>
-                </a:r>
-              </a:p>
-              <a:p>
-                <a:pPr>
-                  <a:spcBef>
-                    <a:spcPts val="1000"/>
-                  </a:spcBef>
-                </a:pPr>
+                  <a:t> determined patch indices, </a:t>
+                </a:r>
+                <a14:m>
+                  <m:oMath xmlns:m="http://schemas.openxmlformats.org/officeDocument/2006/math">
+                    <m:sSub>
+                      <m:sSubPr>
+                        <m:ctrlPr>
+                          <a:rPr lang="en-US" b="0" i="1" smtClean="0">
+                            <a:latin typeface="Cambria Math"/>
+                          </a:rPr>
+                        </m:ctrlPr>
+                      </m:sSubPr>
+                      <m:e>
+                        <m:r>
+                          <a:rPr lang="en-US" b="0" i="1" smtClean="0">
+                            <a:latin typeface="Cambria Math"/>
+                          </a:rPr>
+                          <m:t>𝑥</m:t>
+                        </m:r>
+                      </m:e>
+                      <m:sub>
+                        <m:r>
+                          <a:rPr lang="en-US" b="0" i="1" smtClean="0">
+                            <a:latin typeface="Cambria Math"/>
+                          </a:rPr>
+                          <m:t>𝑖</m:t>
+                        </m:r>
+                      </m:sub>
+                    </m:sSub>
+                  </m:oMath>
+                </a14:m>
                 <a:endParaRPr lang="en-US" dirty="0" smtClean="0"/>
               </a:p>
               <a:p>
-                <a:pPr>
+                <a:pPr lvl="1">
+                  <a:lnSpc>
+                    <a:spcPct val="120000"/>
+                  </a:lnSpc>
                   <a:spcBef>
-                    <a:spcPts val="1000"/>
+                    <a:spcPts val="1200"/>
                   </a:spcBef>
                 </a:pPr>
-                <a:r>
-                  <a:rPr lang="en-US" b="1" dirty="0" smtClean="0"/>
-                  <a:t>Creating the Histogram: </a:t>
-                </a:r>
+                <a14:m>
+                  <m:oMath xmlns:m="http://schemas.openxmlformats.org/officeDocument/2006/math">
+                    <m:r>
+                      <a:rPr lang="en-US" b="0" i="1" smtClean="0">
+                        <a:latin typeface="Cambria Math"/>
+                      </a:rPr>
+                      <m:t>𝑌</m:t>
+                    </m:r>
+                  </m:oMath>
+                </a14:m>
                 <a:r>
                   <a:rPr lang="en-US" dirty="0" smtClean="0"/>
-                  <a:t>For a given image, assign each patch to its closest centroid.  </a:t>
+                  <a:t> – Low resolution version of the original image.</a:t>
                 </a:r>
               </a:p>
             </p:txBody>
@@ -5683,10 +6053,14 @@
               </p:nvPr>
             </p:nvSpPr>
             <p:spPr>
+              <a:xfrm>
+                <a:off x="457200" y="989013"/>
+                <a:ext cx="8366760" cy="5135562"/>
+              </a:xfrm>
               <a:blipFill rotWithShape="1">
                 <a:blip r:embed="rId2"/>
                 <a:stretch>
-                  <a:fillRect l="-963" t="-949" r="-444"/>
+                  <a:fillRect l="-801" t="-712" r="-1020"/>
                 </a:stretch>
               </a:blipFill>
             </p:spPr>
@@ -5708,7 +6082,7 @@
     </p:spTree>
     <p:extLst>
       <p:ext uri="{BB962C8B-B14F-4D97-AF65-F5344CB8AC3E}">
-        <p14:creationId xmlns:p14="http://schemas.microsoft.com/office/powerpoint/2010/main" val="1855633438"/>
+        <p14:creationId xmlns:p14="http://schemas.microsoft.com/office/powerpoint/2010/main" val="1316585190"/>
       </p:ext>
     </p:extLst>
   </p:cSld>
@@ -5752,12 +6126,7 @@
             <p:ph type="title"/>
           </p:nvPr>
         </p:nvSpPr>
-        <p:spPr>
-          <a:xfrm>
-            <a:off x="2105024" y="76200"/>
-            <a:ext cx="7038975" cy="550863"/>
-          </a:xfrm>
-        </p:spPr>
+        <p:spPr/>
         <p:txBody>
           <a:bodyPr>
             <a:noAutofit/>
@@ -5765,89 +6134,656 @@
           <a:lstStyle/>
           <a:p>
             <a:r>
-              <a:rPr lang="en-US" sz="2400" dirty="0" smtClean="0"/>
-              <a:t>“Dense and Noisy” – Generating the Low Res. Image</a:t>
-            </a:r>
-            <a:endParaRPr lang="en-US" sz="2400" dirty="0"/>
+              <a:rPr lang="en-US" sz="2600" dirty="0" smtClean="0"/>
+              <a:t>Maximizing the Patch Assignment Probability</a:t>
+            </a:r>
+            <a:endParaRPr lang="en-US" sz="2600" dirty="0"/>
           </a:p>
         </p:txBody>
       </p:sp>
-      <p:sp>
-        <p:nvSpPr>
-          <p:cNvPr id="3" name="Content Placeholder 2"/>
-          <p:cNvSpPr>
-            <a:spLocks noGrp="1"/>
-          </p:cNvSpPr>
-          <p:nvPr>
-            <p:ph idx="1"/>
-          </p:nvPr>
-        </p:nvSpPr>
-        <p:spPr/>
-        <p:txBody>
-          <a:bodyPr/>
-          <a:lstStyle/>
-          <a:p>
-            <a:r>
-              <a:rPr lang="en-US" b="1" dirty="0" smtClean="0"/>
-              <a:t>Theoretical Motivation: </a:t>
-            </a:r>
-            <a:r>
-              <a:rPr lang="en-US" dirty="0" smtClean="0"/>
-              <a:t>Different colors are more likely to be at different places in an image.</a:t>
-            </a:r>
-          </a:p>
-          <a:p>
-            <a:pPr lvl="1"/>
-            <a:r>
-              <a:rPr lang="en-US" i="1" dirty="0" smtClean="0">
-                <a:solidFill>
-                  <a:srgbClr val="006600"/>
-                </a:solidFill>
-              </a:rPr>
-              <a:t>Example</a:t>
-            </a:r>
-            <a:r>
-              <a:rPr lang="en-US" b="1" dirty="0" smtClean="0"/>
-              <a:t>:</a:t>
-            </a:r>
-            <a:r>
-              <a:rPr lang="en-US" dirty="0" smtClean="0"/>
-              <a:t> Blue (sky) is more likely to be towards the top of the image while brown (soil) tends to be in the image foreground.</a:t>
-            </a:r>
-          </a:p>
-          <a:p>
-            <a:endParaRPr lang="en-US" dirty="0" smtClean="0"/>
-          </a:p>
-          <a:p>
-            <a:r>
-              <a:rPr lang="en-US" b="1" dirty="0" smtClean="0"/>
-              <a:t>Mapping Bins to the Image</a:t>
-            </a:r>
-            <a:r>
-              <a:rPr lang="en-US" dirty="0" smtClean="0"/>
-              <a:t>: Use the training set to generate probability density maps for each histogram bin.</a:t>
-            </a:r>
-          </a:p>
-          <a:p>
-            <a:endParaRPr lang="en-US" dirty="0"/>
-          </a:p>
-          <a:p>
-            <a:r>
-              <a:rPr lang="en-US" b="1" dirty="0" smtClean="0"/>
-              <a:t>Using the Histogram to Create the Low Resolution Image</a:t>
-            </a:r>
-            <a:r>
-              <a:rPr lang="en-US" dirty="0" smtClean="0"/>
-              <a:t>: Use a trained, linear regression function to map a bag of pieces histogram to the training images (i.e. use prior knowledge).</a:t>
-            </a:r>
-            <a:endParaRPr lang="en-US" dirty="0"/>
-          </a:p>
-        </p:txBody>
-      </p:sp>
+      <mc:AlternateContent xmlns:mc="http://schemas.openxmlformats.org/markup-compatibility/2006">
+        <mc:Choice xmlns:a14="http://schemas.microsoft.com/office/drawing/2010/main" Requires="a14">
+          <p:sp>
+            <p:nvSpPr>
+              <p:cNvPr id="3" name="Content Placeholder 2"/>
+              <p:cNvSpPr>
+                <a:spLocks noGrp="1"/>
+              </p:cNvSpPr>
+              <p:nvPr>
+                <p:ph idx="1"/>
+              </p:nvPr>
+            </p:nvSpPr>
+            <p:spPr/>
+            <p:txBody>
+              <a:bodyPr>
+                <a:normAutofit fontScale="92500" lnSpcReduction="20000"/>
+              </a:bodyPr>
+              <a:lstStyle/>
+              <a:p>
+                <a:r>
+                  <a:rPr lang="en-US" dirty="0" smtClean="0"/>
+                  <a:t>For a given patch assignment </a:t>
+                </a:r>
+                <a14:m>
+                  <m:oMath xmlns:m="http://schemas.openxmlformats.org/officeDocument/2006/math">
+                    <m:r>
+                      <a:rPr lang="en-US" b="0" i="1" smtClean="0">
+                        <a:latin typeface="Cambria Math"/>
+                      </a:rPr>
+                      <m:t>𝑋</m:t>
+                    </m:r>
+                  </m:oMath>
+                </a14:m>
+                <a:r>
+                  <a:rPr lang="en-US" dirty="0" smtClean="0"/>
+                  <a:t>, the probability of that assignment is defined as:</a:t>
+                </a:r>
+              </a:p>
+              <a:p>
+                <a:endParaRPr lang="en-US" dirty="0"/>
+              </a:p>
+              <a:p>
+                <a:pPr marL="0" indent="0">
+                  <a:buNone/>
+                </a:pPr>
+                <a14:m>
+                  <m:oMathPara xmlns:m="http://schemas.openxmlformats.org/officeDocument/2006/math">
+                    <m:oMathParaPr>
+                      <m:jc m:val="centerGroup"/>
+                    </m:oMathParaPr>
+                    <m:oMath xmlns:m="http://schemas.openxmlformats.org/officeDocument/2006/math">
+                      <m:r>
+                        <a:rPr lang="en-US" b="0" i="1" smtClean="0">
+                          <a:latin typeface="Cambria Math"/>
+                        </a:rPr>
+                        <m:t>𝑃</m:t>
+                      </m:r>
+                      <m:d>
+                        <m:dPr>
+                          <m:ctrlPr>
+                            <a:rPr lang="en-US" b="0" i="1" smtClean="0">
+                              <a:latin typeface="Cambria Math"/>
+                            </a:rPr>
+                          </m:ctrlPr>
+                        </m:dPr>
+                        <m:e>
+                          <m:r>
+                            <a:rPr lang="en-US" b="0" i="1" smtClean="0">
+                              <a:latin typeface="Cambria Math"/>
+                            </a:rPr>
+                            <m:t>𝑋</m:t>
+                          </m:r>
+                        </m:e>
+                      </m:d>
+                      <m:r>
+                        <a:rPr lang="en-US" b="0" i="1" smtClean="0">
+                          <a:latin typeface="Cambria Math"/>
+                        </a:rPr>
+                        <m:t>=</m:t>
+                      </m:r>
+                      <m:f>
+                        <m:fPr>
+                          <m:ctrlPr>
+                            <a:rPr lang="en-US" b="0" i="1" smtClean="0">
+                              <a:latin typeface="Cambria Math"/>
+                            </a:rPr>
+                          </m:ctrlPr>
+                        </m:fPr>
+                        <m:num>
+                          <m:r>
+                            <a:rPr lang="en-US" b="0" i="1" smtClean="0">
+                              <a:latin typeface="Cambria Math"/>
+                            </a:rPr>
+                            <m:t>1</m:t>
+                          </m:r>
+                        </m:num>
+                        <m:den>
+                          <m:r>
+                            <a:rPr lang="en-US" b="0" i="1" smtClean="0">
+                              <a:latin typeface="Cambria Math"/>
+                            </a:rPr>
+                            <m:t>𝑍</m:t>
+                          </m:r>
+                        </m:den>
+                      </m:f>
+                      <m:nary>
+                        <m:naryPr>
+                          <m:chr m:val="∏"/>
+                          <m:supHide m:val="on"/>
+                          <m:ctrlPr>
+                            <a:rPr lang="en-US" b="0" i="1" smtClean="0">
+                              <a:latin typeface="Cambria Math"/>
+                            </a:rPr>
+                          </m:ctrlPr>
+                        </m:naryPr>
+                        <m:sub>
+                          <m:r>
+                            <a:rPr lang="en-US" b="0" i="1" smtClean="0">
+                              <a:latin typeface="Cambria Math"/>
+                            </a:rPr>
+                            <m:t>𝑖</m:t>
+                          </m:r>
+                        </m:sub>
+                        <m:sup/>
+                        <m:e>
+                          <m:nary>
+                            <m:naryPr>
+                              <m:chr m:val="∏"/>
+                              <m:supHide m:val="on"/>
+                              <m:ctrlPr>
+                                <a:rPr lang="en-US" i="1">
+                                  <a:latin typeface="Cambria Math"/>
+                                </a:rPr>
+                              </m:ctrlPr>
+                            </m:naryPr>
+                            <m:sub>
+                              <m:r>
+                                <a:rPr lang="en-US" i="1">
+                                  <a:latin typeface="Cambria Math"/>
+                                </a:rPr>
+                                <m:t>𝑗</m:t>
+                              </m:r>
+                              <m:r>
+                                <a:rPr lang="en-US" i="1">
+                                  <a:latin typeface="Cambria Math"/>
+                                </a:rPr>
+                                <m:t>∈</m:t>
+                              </m:r>
+                              <m:r>
+                                <a:rPr lang="en-US" i="1">
+                                  <a:latin typeface="Cambria Math"/>
+                                </a:rPr>
+                                <m:t>𝜁</m:t>
+                              </m:r>
+                              <m:d>
+                                <m:dPr>
+                                  <m:ctrlPr>
+                                    <a:rPr lang="en-US" i="1">
+                                      <a:latin typeface="Cambria Math"/>
+                                    </a:rPr>
+                                  </m:ctrlPr>
+                                </m:dPr>
+                                <m:e>
+                                  <m:r>
+                                    <a:rPr lang="en-US" i="1">
+                                      <a:latin typeface="Cambria Math"/>
+                                    </a:rPr>
+                                    <m:t>𝑖</m:t>
+                                  </m:r>
+                                </m:e>
+                              </m:d>
+                            </m:sub>
+                            <m:sup/>
+                            <m:e>
+                              <m:d>
+                                <m:dPr>
+                                  <m:ctrlPr>
+                                    <a:rPr lang="en-US" i="1">
+                                      <a:latin typeface="Cambria Math"/>
+                                    </a:rPr>
+                                  </m:ctrlPr>
+                                </m:dPr>
+                                <m:e>
+                                  <m:sSub>
+                                    <m:sSubPr>
+                                      <m:ctrlPr>
+                                        <a:rPr lang="en-US" i="1">
+                                          <a:latin typeface="Cambria Math"/>
+                                        </a:rPr>
+                                      </m:ctrlPr>
+                                    </m:sSubPr>
+                                    <m:e>
+                                      <m:r>
+                                        <a:rPr lang="en-US" i="1">
+                                          <a:latin typeface="Cambria Math"/>
+                                        </a:rPr>
+                                        <m:t>𝜓</m:t>
+                                      </m:r>
+                                    </m:e>
+                                    <m:sub>
+                                      <m:r>
+                                        <a:rPr lang="en-US" i="1">
+                                          <a:latin typeface="Cambria Math"/>
+                                        </a:rPr>
+                                        <m:t>𝑖𝑗</m:t>
+                                      </m:r>
+                                    </m:sub>
+                                  </m:sSub>
+                                  <m:d>
+                                    <m:dPr>
+                                      <m:ctrlPr>
+                                        <a:rPr lang="en-US" i="1">
+                                          <a:latin typeface="Cambria Math"/>
+                                        </a:rPr>
+                                      </m:ctrlPr>
+                                    </m:dPr>
+                                    <m:e>
+                                      <m:sSub>
+                                        <m:sSubPr>
+                                          <m:ctrlPr>
+                                            <a:rPr lang="en-US" i="1">
+                                              <a:latin typeface="Cambria Math"/>
+                                            </a:rPr>
+                                          </m:ctrlPr>
+                                        </m:sSubPr>
+                                        <m:e>
+                                          <m:r>
+                                            <a:rPr lang="en-US" i="1">
+                                              <a:latin typeface="Cambria Math"/>
+                                            </a:rPr>
+                                            <m:t>𝑥</m:t>
+                                          </m:r>
+                                        </m:e>
+                                        <m:sub>
+                                          <m:r>
+                                            <a:rPr lang="en-US" i="1">
+                                              <a:latin typeface="Cambria Math"/>
+                                            </a:rPr>
+                                            <m:t>𝑖</m:t>
+                                          </m:r>
+                                        </m:sub>
+                                      </m:sSub>
+                                      <m:r>
+                                        <a:rPr lang="en-US" i="1">
+                                          <a:latin typeface="Cambria Math"/>
+                                        </a:rPr>
+                                        <m:t>,</m:t>
+                                      </m:r>
+                                      <m:sSub>
+                                        <m:sSubPr>
+                                          <m:ctrlPr>
+                                            <a:rPr lang="en-US" i="1">
+                                              <a:latin typeface="Cambria Math"/>
+                                            </a:rPr>
+                                          </m:ctrlPr>
+                                        </m:sSubPr>
+                                        <m:e>
+                                          <m:r>
+                                            <a:rPr lang="en-US" i="1">
+                                              <a:latin typeface="Cambria Math"/>
+                                            </a:rPr>
+                                            <m:t>𝑥</m:t>
+                                          </m:r>
+                                        </m:e>
+                                        <m:sub>
+                                          <m:r>
+                                            <a:rPr lang="en-US" i="1">
+                                              <a:latin typeface="Cambria Math"/>
+                                            </a:rPr>
+                                            <m:t>𝑗</m:t>
+                                          </m:r>
+                                        </m:sub>
+                                      </m:sSub>
+                                    </m:e>
+                                  </m:d>
+                                  <m:r>
+                                    <a:rPr lang="en-US" i="1">
+                                      <a:latin typeface="Cambria Math"/>
+                                    </a:rPr>
+                                    <m:t>∗</m:t>
+                                  </m:r>
+                                  <m:r>
+                                    <a:rPr lang="en-US" i="1">
+                                      <a:latin typeface="Cambria Math"/>
+                                    </a:rPr>
+                                    <m:t>𝐸</m:t>
+                                  </m:r>
+                                  <m:r>
+                                    <a:rPr lang="en-US" i="1">
+                                      <a:latin typeface="Cambria Math"/>
+                                    </a:rPr>
+                                    <m:t>(</m:t>
+                                  </m:r>
+                                  <m:r>
+                                    <a:rPr lang="en-US" i="1">
+                                      <a:latin typeface="Cambria Math"/>
+                                    </a:rPr>
+                                    <m:t>𝑥</m:t>
+                                  </m:r>
+                                  <m:r>
+                                    <a:rPr lang="en-US" i="1">
+                                      <a:latin typeface="Cambria Math"/>
+                                    </a:rPr>
+                                    <m:t>)</m:t>
+                                  </m:r>
+                                </m:e>
+                              </m:d>
+                            </m:e>
+                          </m:nary>
+                        </m:e>
+                      </m:nary>
+                    </m:oMath>
+                  </m:oMathPara>
+                </a14:m>
+                <a:endParaRPr lang="en-US" dirty="0" smtClean="0"/>
+              </a:p>
+              <a:p>
+                <a:pPr marL="0" indent="0">
+                  <a:buNone/>
+                </a:pPr>
+                <a:endParaRPr lang="en-US" dirty="0"/>
+              </a:p>
+              <a:p>
+                <a14:m>
+                  <m:oMath xmlns:m="http://schemas.openxmlformats.org/officeDocument/2006/math">
+                    <m:r>
+                      <a:rPr lang="en-US" b="0" i="1" smtClean="0">
+                        <a:latin typeface="Cambria Math"/>
+                      </a:rPr>
+                      <m:t>𝑖</m:t>
+                    </m:r>
+                  </m:oMath>
+                </a14:m>
+                <a:r>
+                  <a:rPr lang="en-US" dirty="0"/>
+                  <a:t> </a:t>
+                </a:r>
+                <a:r>
+                  <a:rPr lang="en-US" dirty="0" smtClean="0"/>
+                  <a:t>: </a:t>
+                </a:r>
+                <a14:m>
+                  <m:oMath xmlns:m="http://schemas.openxmlformats.org/officeDocument/2006/math">
+                    <m:sSup>
+                      <m:sSupPr>
+                        <m:ctrlPr>
+                          <a:rPr lang="en-US" b="0" i="1" dirty="0" smtClean="0">
+                            <a:latin typeface="Cambria Math"/>
+                          </a:rPr>
+                        </m:ctrlPr>
+                      </m:sSupPr>
+                      <m:e>
+                        <m:r>
+                          <a:rPr lang="en-US" b="0" i="1" dirty="0" smtClean="0">
+                            <a:latin typeface="Cambria Math"/>
+                          </a:rPr>
+                          <m:t>𝑖</m:t>
+                        </m:r>
+                      </m:e>
+                      <m:sup>
+                        <m:r>
+                          <a:rPr lang="en-US" b="0" i="1" dirty="0" smtClean="0">
+                            <a:latin typeface="Cambria Math"/>
+                          </a:rPr>
+                          <m:t>𝑡h</m:t>
+                        </m:r>
+                      </m:sup>
+                    </m:sSup>
+                  </m:oMath>
+                </a14:m>
+                <a:r>
+                  <a:rPr lang="en-US" b="0" i="1" dirty="0" smtClean="0">
+                    <a:latin typeface="Cambria Math"/>
+                  </a:rPr>
+                  <a:t> </a:t>
+                </a:r>
+                <a:r>
+                  <a:rPr lang="en-US" dirty="0" smtClean="0"/>
+                  <a:t>node in the MRF/board</a:t>
+                </a:r>
+              </a:p>
+              <a:p>
+                <a14:m>
+                  <m:oMath xmlns:m="http://schemas.openxmlformats.org/officeDocument/2006/math">
+                    <m:r>
+                      <a:rPr lang="en-US" b="0" i="1" smtClean="0">
+                        <a:latin typeface="Cambria Math"/>
+                      </a:rPr>
+                      <m:t>𝑁</m:t>
+                    </m:r>
+                  </m:oMath>
+                </a14:m>
+                <a:r>
+                  <a:rPr lang="en-US" b="0" i="1" dirty="0" smtClean="0">
+                    <a:latin typeface="Cambria Math"/>
+                  </a:rPr>
+                  <a:t> </a:t>
+                </a:r>
+                <a:r>
+                  <a:rPr lang="en-US" dirty="0"/>
+                  <a:t>: </a:t>
+                </a:r>
+                <a:r>
+                  <a:rPr lang="en-US" dirty="0" smtClean="0"/>
+                  <a:t>Number of nodes in the MRF/board.</a:t>
+                </a:r>
+                <a:endParaRPr lang="en-US" b="0" i="1" dirty="0" smtClean="0">
+                  <a:latin typeface="Cambria Math"/>
+                </a:endParaRPr>
+              </a:p>
+              <a:p>
+                <a14:m>
+                  <m:oMath xmlns:m="http://schemas.openxmlformats.org/officeDocument/2006/math">
+                    <m:r>
+                      <a:rPr lang="en-US" b="0" i="1" smtClean="0">
+                        <a:latin typeface="Cambria Math"/>
+                      </a:rPr>
+                      <m:t>𝜙</m:t>
+                    </m:r>
+                  </m:oMath>
+                </a14:m>
+                <a:r>
+                  <a:rPr lang="en-US" dirty="0" smtClean="0"/>
+                  <a:t> : User constraints (e.g. board size)</a:t>
+                </a:r>
+              </a:p>
+              <a:p>
+                <a14:m>
+                  <m:oMath xmlns:m="http://schemas.openxmlformats.org/officeDocument/2006/math">
+                    <m:r>
+                      <a:rPr lang="en-US" b="0" i="1" smtClean="0">
+                        <a:latin typeface="Cambria Math"/>
+                      </a:rPr>
+                      <m:t>𝜙</m:t>
+                    </m:r>
+                  </m:oMath>
+                </a14:m>
+                <a:r>
+                  <a:rPr lang="en-US" dirty="0" smtClean="0"/>
+                  <a:t> : Patch to patch compatibility</a:t>
+                </a:r>
+              </a:p>
+              <a:p>
+                <a14:m>
+                  <m:oMath xmlns:m="http://schemas.openxmlformats.org/officeDocument/2006/math">
+                    <m:r>
+                      <a:rPr lang="en-US" i="1">
+                        <a:latin typeface="Cambria Math"/>
+                      </a:rPr>
+                      <m:t>𝜁</m:t>
+                    </m:r>
+                    <m:d>
+                      <m:dPr>
+                        <m:ctrlPr>
+                          <a:rPr lang="en-US" b="0" i="1" smtClean="0">
+                            <a:latin typeface="Cambria Math"/>
+                          </a:rPr>
+                        </m:ctrlPr>
+                      </m:dPr>
+                      <m:e>
+                        <m:r>
+                          <a:rPr lang="en-US" b="0" i="1" smtClean="0">
+                            <a:latin typeface="Cambria Math"/>
+                          </a:rPr>
+                          <m:t>𝑖</m:t>
+                        </m:r>
+                      </m:e>
+                    </m:d>
+                  </m:oMath>
+                </a14:m>
+                <a:r>
+                  <a:rPr lang="en-US" dirty="0" smtClean="0"/>
+                  <a:t> : Markov blanket of node </a:t>
+                </a:r>
+                <a14:m>
+                  <m:oMath xmlns:m="http://schemas.openxmlformats.org/officeDocument/2006/math">
+                    <m:r>
+                      <a:rPr lang="en-US" b="0" i="1" smtClean="0">
+                        <a:latin typeface="Cambria Math"/>
+                      </a:rPr>
+                      <m:t>𝑖</m:t>
+                    </m:r>
+                  </m:oMath>
+                </a14:m>
+                <a:endParaRPr lang="en-US" dirty="0" smtClean="0"/>
+              </a:p>
+              <a:p>
+                <a14:m>
+                  <m:oMath xmlns:m="http://schemas.openxmlformats.org/officeDocument/2006/math">
+                    <m:r>
+                      <a:rPr lang="en-US" b="0" i="1" smtClean="0">
+                        <a:latin typeface="Cambria Math"/>
+                      </a:rPr>
+                      <m:t>𝐸</m:t>
+                    </m:r>
+                    <m:d>
+                      <m:dPr>
+                        <m:ctrlPr>
+                          <a:rPr lang="en-US" b="0" i="1" smtClean="0">
+                            <a:latin typeface="Cambria Math"/>
+                          </a:rPr>
+                        </m:ctrlPr>
+                      </m:dPr>
+                      <m:e>
+                        <m:r>
+                          <a:rPr lang="en-US" b="0" i="1" smtClean="0">
+                            <a:latin typeface="Cambria Math"/>
+                          </a:rPr>
+                          <m:t>𝑋</m:t>
+                        </m:r>
+                      </m:e>
+                    </m:d>
+                  </m:oMath>
+                </a14:m>
+                <a:r>
+                  <a:rPr lang="en-US" i="1" dirty="0" smtClean="0">
+                    <a:latin typeface="Cambria Math"/>
+                  </a:rPr>
+                  <a:t> </a:t>
+                </a:r>
+                <a:r>
+                  <a:rPr lang="en-US" dirty="0"/>
+                  <a:t>: </a:t>
+                </a:r>
+                <a:r>
+                  <a:rPr lang="en-US" dirty="0" smtClean="0"/>
+                  <a:t>Exclusion term that discourages patches being used more than once.</a:t>
+                </a:r>
+                <a:endParaRPr lang="en-US" i="1" dirty="0" smtClean="0">
+                  <a:latin typeface="Cambria Math"/>
+                </a:endParaRPr>
+              </a:p>
+              <a:p>
+                <a14:m>
+                  <m:oMath xmlns:m="http://schemas.openxmlformats.org/officeDocument/2006/math">
+                    <m:r>
+                      <a:rPr lang="en-US" i="1">
+                        <a:latin typeface="Cambria Math"/>
+                      </a:rPr>
+                      <m:t>𝑍</m:t>
+                    </m:r>
+                  </m:oMath>
+                </a14:m>
+                <a:r>
+                  <a:rPr lang="en-US" dirty="0"/>
+                  <a:t> : Normalization term to ensure </a:t>
+                </a:r>
+                <a14:m>
+                  <m:oMath xmlns:m="http://schemas.openxmlformats.org/officeDocument/2006/math">
+                    <m:r>
+                      <a:rPr lang="en-US" b="0" i="1" smtClean="0">
+                        <a:latin typeface="Cambria Math"/>
+                      </a:rPr>
+                      <m:t>∫</m:t>
+                    </m:r>
+                    <m:r>
+                      <a:rPr lang="en-US" i="1">
+                        <a:latin typeface="Cambria Math"/>
+                      </a:rPr>
+                      <m:t>𝑃</m:t>
+                    </m:r>
+                    <m:d>
+                      <m:dPr>
+                        <m:ctrlPr>
+                          <a:rPr lang="en-US" i="1">
+                            <a:latin typeface="Cambria Math"/>
+                          </a:rPr>
+                        </m:ctrlPr>
+                      </m:dPr>
+                      <m:e>
+                        <m:r>
+                          <a:rPr lang="en-US" i="1">
+                            <a:latin typeface="Cambria Math"/>
+                          </a:rPr>
+                          <m:t>𝑋</m:t>
+                        </m:r>
+                      </m:e>
+                    </m:d>
+                    <m:r>
+                      <a:rPr lang="en-US" b="0" i="1" smtClean="0">
+                        <a:latin typeface="Cambria Math"/>
+                      </a:rPr>
+                      <m:t> </m:t>
+                    </m:r>
+                    <m:r>
+                      <a:rPr lang="en-US" b="0" i="1" smtClean="0">
+                        <a:latin typeface="Cambria Math"/>
+                      </a:rPr>
+                      <m:t>𝑑𝑋</m:t>
+                    </m:r>
+                  </m:oMath>
+                </a14:m>
+                <a:r>
+                  <a:rPr lang="en-US" dirty="0"/>
+                  <a:t> </a:t>
+                </a:r>
+                <a:r>
+                  <a:rPr lang="en-US" dirty="0" smtClean="0"/>
+                  <a:t>equals 1</a:t>
+                </a:r>
+                <a:endParaRPr lang="en-US" dirty="0"/>
+              </a:p>
+            </p:txBody>
+          </p:sp>
+        </mc:Choice>
+        <mc:Fallback>
+          <p:sp>
+            <p:nvSpPr>
+              <p:cNvPr id="3" name="Content Placeholder 2"/>
+              <p:cNvSpPr>
+                <a:spLocks noGrp="1" noRot="1" noChangeAspect="1" noMove="1" noResize="1" noEditPoints="1" noAdjustHandles="1" noChangeArrowheads="1" noChangeShapeType="1" noTextEdit="1"/>
+              </p:cNvSpPr>
+              <p:nvPr>
+                <p:ph idx="1"/>
+              </p:nvPr>
+            </p:nvSpPr>
+            <p:spPr>
+              <a:blipFill rotWithShape="1">
+                <a:blip r:embed="rId2"/>
+                <a:stretch>
+                  <a:fillRect l="-815" t="-1898"/>
+                </a:stretch>
+              </a:blipFill>
+            </p:spPr>
+            <p:txBody>
+              <a:bodyPr/>
+              <a:lstStyle/>
+              <a:p>
+                <a:r>
+                  <a:rPr lang="en-US">
+                    <a:noFill/>
+                  </a:rPr>
+                  <a:t> </a:t>
+                </a:r>
+              </a:p>
+            </p:txBody>
+          </p:sp>
+        </mc:Fallback>
+      </mc:AlternateContent>
     </p:spTree>
     <p:extLst>
       <p:ext uri="{BB962C8B-B14F-4D97-AF65-F5344CB8AC3E}">
-        <p14:creationId xmlns:p14="http://schemas.microsoft.com/office/powerpoint/2010/main" val="58278014"/>
+        <p14:creationId xmlns:p14="http://schemas.microsoft.com/office/powerpoint/2010/main" val="1291985632"/>
       </p:ext>
     </p:extLst>
   </p:cSld>
@@ -5900,6 +6836,942 @@
           <a:p>
             <a:r>
               <a:rPr lang="en-US" dirty="0" smtClean="0"/>
+              <a:t>Loopy Belief Propagation Solver</a:t>
+            </a:r>
+            <a:endParaRPr lang="en-US" dirty="0"/>
+          </a:p>
+        </p:txBody>
+      </p:sp>
+      <p:sp>
+        <p:nvSpPr>
+          <p:cNvPr id="3" name="Content Placeholder 2"/>
+          <p:cNvSpPr>
+            <a:spLocks noGrp="1"/>
+          </p:cNvSpPr>
+          <p:nvPr>
+            <p:ph idx="1"/>
+          </p:nvPr>
+        </p:nvSpPr>
+        <p:spPr/>
+        <p:txBody>
+          <a:bodyPr/>
+          <a:lstStyle/>
+          <a:p>
+            <a:r>
+              <a:rPr lang="en-US" dirty="0" smtClean="0"/>
+              <a:t>Maximizes the preceding probability function using loopy belief propagation.</a:t>
+            </a:r>
+            <a:endParaRPr lang="en-US" dirty="0"/>
+          </a:p>
+          <a:p>
+            <a:endParaRPr lang="en-US" dirty="0"/>
+          </a:p>
+          <a:p>
+            <a:r>
+              <a:rPr lang="en-US" dirty="0" smtClean="0"/>
+              <a:t>Susceptible to local maxima so random restarts may be performed.</a:t>
+            </a:r>
+          </a:p>
+          <a:p>
+            <a:endParaRPr lang="en-US" dirty="0"/>
+          </a:p>
+          <a:p>
+            <a:r>
+              <a:rPr lang="en-US" b="1" dirty="0" smtClean="0"/>
+              <a:t>Question:</a:t>
+            </a:r>
+            <a:r>
+              <a:rPr lang="en-US" dirty="0" smtClean="0"/>
+              <a:t> What if I do not have access to a low resolution version of the original image?  Can I make one or use a substitute?</a:t>
+            </a:r>
+            <a:endParaRPr lang="en-US" dirty="0"/>
+          </a:p>
+        </p:txBody>
+      </p:sp>
+    </p:spTree>
+    <p:extLst>
+      <p:ext uri="{BB962C8B-B14F-4D97-AF65-F5344CB8AC3E}">
+        <p14:creationId xmlns:p14="http://schemas.microsoft.com/office/powerpoint/2010/main" val="674603872"/>
+      </p:ext>
+    </p:extLst>
+  </p:cSld>
+  <p:clrMapOvr>
+    <a:masterClrMapping/>
+  </p:clrMapOvr>
+  <p:timing>
+    <p:tnLst>
+      <p:par>
+        <p:cTn id="1" dur="indefinite" restart="never" nodeType="tmRoot"/>
+      </p:par>
+    </p:tnLst>
+  </p:timing>
+</p:sld>
+</file>
+
+<file path=ppt/slides/slide19.xml><?xml version="1.0" encoding="utf-8"?>
+<p:sld xmlns:a="http://schemas.openxmlformats.org/drawingml/2006/main" xmlns:r="http://schemas.openxmlformats.org/officeDocument/2006/relationships" xmlns:p="http://schemas.openxmlformats.org/presentationml/2006/main">
+  <p:cSld>
+    <p:spTree>
+      <p:nvGrpSpPr>
+        <p:cNvPr id="1" name=""/>
+        <p:cNvGrpSpPr/>
+        <p:nvPr/>
+      </p:nvGrpSpPr>
+      <p:grpSpPr>
+        <a:xfrm>
+          <a:off x="0" y="0"/>
+          <a:ext cx="0" cy="0"/>
+          <a:chOff x="0" y="0"/>
+          <a:chExt cx="0" cy="0"/>
+        </a:xfrm>
+      </p:grpSpPr>
+      <p:sp>
+        <p:nvSpPr>
+          <p:cNvPr id="2" name="Title 1"/>
+          <p:cNvSpPr>
+            <a:spLocks noGrp="1"/>
+          </p:cNvSpPr>
+          <p:nvPr>
+            <p:ph type="title"/>
+          </p:nvPr>
+        </p:nvSpPr>
+        <p:spPr/>
+        <p:txBody>
+          <a:bodyPr>
+            <a:normAutofit/>
+          </a:bodyPr>
+          <a:lstStyle/>
+          <a:p>
+            <a:r>
+              <a:rPr lang="en-US" sz="2800" dirty="0" smtClean="0"/>
+              <a:t>“Dense and Noisy” Estimation</a:t>
+            </a:r>
+            <a:endParaRPr lang="en-US" sz="2800" dirty="0"/>
+          </a:p>
+        </p:txBody>
+      </p:sp>
+      <mc:AlternateContent xmlns:mc="http://schemas.openxmlformats.org/markup-compatibility/2006">
+        <mc:Choice xmlns:a14="http://schemas.microsoft.com/office/drawing/2010/main" Requires="a14">
+          <p:sp>
+            <p:nvSpPr>
+              <p:cNvPr id="3" name="Content Placeholder 2"/>
+              <p:cNvSpPr>
+                <a:spLocks noGrp="1"/>
+              </p:cNvSpPr>
+              <p:nvPr>
+                <p:ph idx="1"/>
+              </p:nvPr>
+            </p:nvSpPr>
+            <p:spPr/>
+            <p:txBody>
+              <a:bodyPr/>
+              <a:lstStyle/>
+              <a:p>
+                <a:r>
+                  <a:rPr lang="en-US" dirty="0" smtClean="0"/>
+                  <a:t>Proposed by Cho </a:t>
+                </a:r>
+                <a:r>
+                  <a:rPr lang="en-US" i="1" dirty="0" smtClean="0"/>
+                  <a:t>et. al. </a:t>
+                </a:r>
+                <a:r>
+                  <a:rPr lang="en-US" dirty="0" smtClean="0"/>
+                  <a:t>in [7] in 2010.</a:t>
+                </a:r>
+                <a:endParaRPr lang="en-US" dirty="0" smtClean="0"/>
+              </a:p>
+              <a:p>
+                <a:endParaRPr lang="en-US" dirty="0" smtClean="0"/>
+              </a:p>
+              <a:p>
+                <a:r>
+                  <a:rPr lang="en-US" b="1" smtClean="0"/>
+                  <a:t>Review: </a:t>
+                </a:r>
+                <a:r>
+                  <a:rPr lang="en-US" dirty="0" smtClean="0"/>
+                  <a:t>In Cho </a:t>
+                </a:r>
+                <a:r>
+                  <a:rPr lang="en-US" i="1" dirty="0" smtClean="0"/>
+                  <a:t>et. al.</a:t>
+                </a:r>
+                <a:r>
+                  <a:rPr lang="en-US" dirty="0" smtClean="0"/>
+                  <a:t>’s work in [8], they assumed access to a correct, low resolution version of the original image.</a:t>
+                </a:r>
+              </a:p>
+              <a:p>
+                <a:pPr lvl="1"/>
+                <a:r>
+                  <a:rPr lang="en-US" dirty="0" smtClean="0"/>
+                  <a:t>In many real world applications, such a low resolution image is not available.</a:t>
+                </a:r>
+              </a:p>
+              <a:p>
+                <a:endParaRPr lang="en-US" dirty="0" smtClean="0"/>
+              </a:p>
+              <a:p>
+                <a:r>
+                  <a:rPr lang="en-US" b="1" dirty="0" smtClean="0"/>
+                  <a:t>Solution:</a:t>
+                </a:r>
+                <a:r>
+                  <a:rPr lang="en-US" dirty="0" smtClean="0"/>
+                  <a:t> Estimate a low resolution image from a “bag of patches.”  The simplified procedure is:</a:t>
+                </a:r>
+              </a:p>
+              <a:p>
+                <a:pPr lvl="1"/>
+                <a:r>
+                  <a:rPr lang="en-US" dirty="0" smtClean="0"/>
+                  <a:t>Creating a histogram of the bag of patches</a:t>
+                </a:r>
+              </a:p>
+              <a:p>
+                <a:pPr lvl="1"/>
+                <a:r>
+                  <a:rPr lang="en-US" dirty="0" smtClean="0"/>
+                  <a:t>“Estimate” a low resolution version by comparing the histogram to a set of </a:t>
+                </a:r>
+                <a14:m>
+                  <m:oMath xmlns:m="http://schemas.openxmlformats.org/officeDocument/2006/math">
+                    <m:r>
+                      <a:rPr lang="en-US" b="0" i="1" smtClean="0">
+                        <a:latin typeface="Cambria Math"/>
+                      </a:rPr>
+                      <m:t>𝐾</m:t>
+                    </m:r>
+                  </m:oMath>
+                </a14:m>
+                <a:r>
+                  <a:rPr lang="en-US" dirty="0" smtClean="0"/>
+                  <a:t> centroids with predefined low resolution images.</a:t>
+                </a:r>
+              </a:p>
+              <a:p>
+                <a:pPr lvl="1"/>
+                <a:endParaRPr lang="en-US" dirty="0" smtClean="0"/>
+              </a:p>
+              <a:p>
+                <a:endParaRPr lang="en-US" dirty="0"/>
+              </a:p>
+            </p:txBody>
+          </p:sp>
+        </mc:Choice>
+        <mc:Fallback>
+          <p:sp>
+            <p:nvSpPr>
+              <p:cNvPr id="3" name="Content Placeholder 2"/>
+              <p:cNvSpPr>
+                <a:spLocks noGrp="1" noRot="1" noChangeAspect="1" noMove="1" noResize="1" noEditPoints="1" noAdjustHandles="1" noChangeArrowheads="1" noChangeShapeType="1" noTextEdit="1"/>
+              </p:cNvSpPr>
+              <p:nvPr>
+                <p:ph idx="1"/>
+              </p:nvPr>
+            </p:nvSpPr>
+            <p:spPr>
+              <a:blipFill rotWithShape="1">
+                <a:blip r:embed="rId2"/>
+                <a:stretch>
+                  <a:fillRect l="-963" t="-949" r="-1333"/>
+                </a:stretch>
+              </a:blipFill>
+            </p:spPr>
+            <p:txBody>
+              <a:bodyPr/>
+              <a:lstStyle/>
+              <a:p>
+                <a:r>
+                  <a:rPr lang="en-US">
+                    <a:noFill/>
+                  </a:rPr>
+                  <a:t> </a:t>
+                </a:r>
+              </a:p>
+            </p:txBody>
+          </p:sp>
+        </mc:Fallback>
+      </mc:AlternateContent>
+    </p:spTree>
+    <p:extLst>
+      <p:ext uri="{BB962C8B-B14F-4D97-AF65-F5344CB8AC3E}">
+        <p14:creationId xmlns:p14="http://schemas.microsoft.com/office/powerpoint/2010/main" val="2946689892"/>
+      </p:ext>
+    </p:extLst>
+  </p:cSld>
+  <p:clrMapOvr>
+    <a:masterClrMapping/>
+  </p:clrMapOvr>
+  <p:timing>
+    <p:tnLst>
+      <p:par>
+        <p:cTn id="1" dur="indefinite" restart="never" nodeType="tmRoot"/>
+      </p:par>
+    </p:tnLst>
+  </p:timing>
+</p:sld>
+</file>
+
+<file path=ppt/slides/slide2.xml><?xml version="1.0" encoding="utf-8"?>
+<p:sld xmlns:a="http://schemas.openxmlformats.org/drawingml/2006/main" xmlns:r="http://schemas.openxmlformats.org/officeDocument/2006/relationships" xmlns:p="http://schemas.openxmlformats.org/presentationml/2006/main">
+  <p:cSld>
+    <p:spTree>
+      <p:nvGrpSpPr>
+        <p:cNvPr id="1" name=""/>
+        <p:cNvGrpSpPr/>
+        <p:nvPr/>
+      </p:nvGrpSpPr>
+      <p:grpSpPr>
+        <a:xfrm>
+          <a:off x="0" y="0"/>
+          <a:ext cx="0" cy="0"/>
+          <a:chOff x="0" y="0"/>
+          <a:chExt cx="0" cy="0"/>
+        </a:xfrm>
+      </p:grpSpPr>
+      <p:sp>
+        <p:nvSpPr>
+          <p:cNvPr id="2" name="Title 1"/>
+          <p:cNvSpPr>
+            <a:spLocks noGrp="1"/>
+          </p:cNvSpPr>
+          <p:nvPr>
+            <p:ph type="title"/>
+          </p:nvPr>
+        </p:nvSpPr>
+        <p:spPr/>
+        <p:txBody>
+          <a:bodyPr>
+            <a:normAutofit fontScale="90000"/>
+          </a:bodyPr>
+          <a:lstStyle/>
+          <a:p>
+            <a:r>
+              <a:rPr lang="en-US" dirty="0" smtClean="0"/>
+              <a:t>Introduction</a:t>
+            </a:r>
+            <a:endParaRPr lang="en-US" dirty="0"/>
+          </a:p>
+        </p:txBody>
+      </p:sp>
+      <p:sp>
+        <p:nvSpPr>
+          <p:cNvPr id="3" name="Content Placeholder 2"/>
+          <p:cNvSpPr>
+            <a:spLocks noGrp="1"/>
+          </p:cNvSpPr>
+          <p:nvPr>
+            <p:ph idx="1"/>
+          </p:nvPr>
+        </p:nvSpPr>
+        <p:spPr/>
+        <p:txBody>
+          <a:bodyPr/>
+          <a:lstStyle/>
+          <a:p>
+            <a:r>
+              <a:rPr lang="en-US" dirty="0" smtClean="0"/>
+              <a:t>“Jigsaw </a:t>
+            </a:r>
+            <a:r>
+              <a:rPr lang="en-US" dirty="0"/>
+              <a:t>Puzzle Problem”</a:t>
+            </a:r>
+          </a:p>
+          <a:p>
+            <a:pPr lvl="1"/>
+            <a:r>
+              <a:rPr lang="en-US" b="1" dirty="0"/>
+              <a:t>Problem Statement: </a:t>
+            </a:r>
+            <a:r>
+              <a:rPr lang="en-US" dirty="0"/>
+              <a:t>Reconstruct an image from a set of image </a:t>
+            </a:r>
+            <a:r>
+              <a:rPr lang="en-US" dirty="0" smtClean="0"/>
+              <a:t>patches</a:t>
+            </a:r>
+          </a:p>
+          <a:p>
+            <a:pPr lvl="1"/>
+            <a:r>
+              <a:rPr lang="en-US" b="1" dirty="0"/>
+              <a:t>Problem Complexity: </a:t>
+            </a:r>
+            <a:r>
+              <a:rPr lang="en-US" dirty="0" smtClean="0"/>
+              <a:t>NP-Complete </a:t>
+            </a:r>
+            <a:r>
+              <a:rPr lang="en-US" dirty="0"/>
+              <a:t>(via the set partition problem)</a:t>
+            </a:r>
+            <a:r>
+              <a:rPr lang="en-US" dirty="0" smtClean="0"/>
+              <a:t> </a:t>
+            </a:r>
+            <a:r>
+              <a:rPr lang="en-US" dirty="0"/>
+              <a:t>when pairwise affinity of pieces is unreliable [1</a:t>
+            </a:r>
+            <a:r>
+              <a:rPr lang="en-US" dirty="0" smtClean="0"/>
+              <a:t>]</a:t>
+            </a:r>
+          </a:p>
+          <a:p>
+            <a:pPr marL="0" indent="0">
+              <a:buNone/>
+            </a:pPr>
+            <a:endParaRPr lang="en-US" dirty="0" smtClean="0"/>
+          </a:p>
+          <a:p>
+            <a:r>
+              <a:rPr lang="en-US" b="1" dirty="0" smtClean="0"/>
+              <a:t>Problem </a:t>
+            </a:r>
+            <a:r>
+              <a:rPr lang="en-US" b="1" dirty="0"/>
+              <a:t>Formulation</a:t>
+            </a:r>
+            <a:r>
+              <a:rPr lang="en-US" dirty="0"/>
+              <a:t>: Set of square, non-overlapping patches</a:t>
+            </a:r>
+          </a:p>
+          <a:p>
+            <a:pPr lvl="1"/>
+            <a:r>
+              <a:rPr lang="en-US" dirty="0"/>
+              <a:t>This </a:t>
+            </a:r>
+            <a:r>
+              <a:rPr lang="en-US" dirty="0" smtClean="0"/>
+              <a:t>specific type </a:t>
+            </a:r>
+            <a:r>
+              <a:rPr lang="en-US" dirty="0"/>
+              <a:t>of puzzle is known as a “jig swap puzzle” [7]</a:t>
+            </a:r>
+          </a:p>
+          <a:p>
+            <a:pPr lvl="1"/>
+            <a:r>
+              <a:rPr lang="en-US" i="1" dirty="0"/>
+              <a:t>Variation of the Problem</a:t>
+            </a:r>
+            <a:r>
+              <a:rPr lang="en-US" dirty="0"/>
+              <a:t>: Allow/disallow patch </a:t>
+            </a:r>
+            <a:r>
+              <a:rPr lang="en-US" dirty="0" smtClean="0"/>
+              <a:t>rotation</a:t>
+            </a:r>
+          </a:p>
+          <a:p>
+            <a:pPr lvl="1"/>
+            <a:endParaRPr lang="en-US" dirty="0"/>
+          </a:p>
+          <a:p>
+            <a:r>
+              <a:rPr lang="en-US" b="1" dirty="0"/>
+              <a:t>A Key Difference with Standard Jigsaw Puzzle Solving: </a:t>
+            </a:r>
+            <a:r>
+              <a:rPr lang="en-US" dirty="0"/>
+              <a:t>The source image you are trying to reconstruct is unknown</a:t>
+            </a:r>
+            <a:r>
+              <a:rPr lang="en-US" dirty="0" smtClean="0"/>
+              <a:t>.</a:t>
+            </a:r>
+            <a:endParaRPr lang="en-US" dirty="0"/>
+          </a:p>
+        </p:txBody>
+      </p:sp>
+    </p:spTree>
+    <p:extLst>
+      <p:ext uri="{BB962C8B-B14F-4D97-AF65-F5344CB8AC3E}">
+        <p14:creationId xmlns:p14="http://schemas.microsoft.com/office/powerpoint/2010/main" val="20947063"/>
+      </p:ext>
+    </p:extLst>
+  </p:cSld>
+  <p:clrMapOvr>
+    <a:masterClrMapping/>
+  </p:clrMapOvr>
+  <p:timing>
+    <p:tnLst>
+      <p:par>
+        <p:cTn id="1" dur="indefinite" restart="never" nodeType="tmRoot"/>
+      </p:par>
+    </p:tnLst>
+  </p:timing>
+</p:sld>
+</file>
+
+<file path=ppt/slides/slide20.xml><?xml version="1.0" encoding="utf-8"?>
+<p:sld xmlns:a="http://schemas.openxmlformats.org/drawingml/2006/main" xmlns:r="http://schemas.openxmlformats.org/officeDocument/2006/relationships" xmlns:p="http://schemas.openxmlformats.org/presentationml/2006/main">
+  <p:cSld>
+    <p:spTree>
+      <p:nvGrpSpPr>
+        <p:cNvPr id="1" name=""/>
+        <p:cNvGrpSpPr/>
+        <p:nvPr/>
+      </p:nvGrpSpPr>
+      <p:grpSpPr>
+        <a:xfrm>
+          <a:off x="0" y="0"/>
+          <a:ext cx="0" cy="0"/>
+          <a:chOff x="0" y="0"/>
+          <a:chExt cx="0" cy="0"/>
+        </a:xfrm>
+      </p:grpSpPr>
+      <p:sp>
+        <p:nvSpPr>
+          <p:cNvPr id="2" name="Title 1"/>
+          <p:cNvSpPr>
+            <a:spLocks noGrp="1"/>
+          </p:cNvSpPr>
+          <p:nvPr>
+            <p:ph type="title"/>
+          </p:nvPr>
+        </p:nvSpPr>
+        <p:spPr>
+          <a:xfrm>
+            <a:off x="1790700" y="127002"/>
+            <a:ext cx="7353300" cy="550863"/>
+          </a:xfrm>
+        </p:spPr>
+        <p:txBody>
+          <a:bodyPr>
+            <a:noAutofit/>
+          </a:bodyPr>
+          <a:lstStyle/>
+          <a:p>
+            <a:r>
+              <a:rPr lang="en-US" sz="2400" dirty="0" smtClean="0"/>
+              <a:t>“Dense and Noisy” Clustering </a:t>
+            </a:r>
+            <a:br>
+              <a:rPr lang="en-US" sz="2400" dirty="0" smtClean="0"/>
+            </a:br>
+            <a:r>
+              <a:rPr lang="en-US" sz="2400" dirty="0" smtClean="0"/>
+              <a:t>and Histogram Generation</a:t>
+            </a:r>
+            <a:endParaRPr lang="en-US" sz="2400" dirty="0"/>
+          </a:p>
+        </p:txBody>
+      </p:sp>
+      <mc:AlternateContent xmlns:mc="http://schemas.openxmlformats.org/markup-compatibility/2006">
+        <mc:Choice xmlns:a14="http://schemas.microsoft.com/office/drawing/2010/main" Requires="a14">
+          <p:sp>
+            <p:nvSpPr>
+              <p:cNvPr id="3" name="Content Placeholder 2"/>
+              <p:cNvSpPr>
+                <a:spLocks noGrp="1"/>
+              </p:cNvSpPr>
+              <p:nvPr>
+                <p:ph idx="1"/>
+              </p:nvPr>
+            </p:nvSpPr>
+            <p:spPr/>
+            <p:txBody>
+              <a:bodyPr/>
+              <a:lstStyle/>
+              <a:p>
+                <a:pPr>
+                  <a:spcBef>
+                    <a:spcPts val="1000"/>
+                  </a:spcBef>
+                </a:pPr>
+                <a:r>
+                  <a:rPr lang="en-US" b="1" dirty="0" smtClean="0"/>
+                  <a:t>Training Set:</a:t>
+                </a:r>
+                <a:r>
+                  <a:rPr lang="en-US" dirty="0" smtClean="0"/>
+                  <a:t> 8.5M patches from 15,000 images.</a:t>
+                </a:r>
+              </a:p>
+              <a:p>
+                <a:pPr lvl="1">
+                  <a:spcBef>
+                    <a:spcPts val="1000"/>
+                  </a:spcBef>
+                </a:pPr>
+                <a:r>
+                  <a:rPr lang="en-US" i="1" dirty="0">
+                    <a:solidFill>
+                      <a:srgbClr val="006600"/>
+                    </a:solidFill>
+                  </a:rPr>
+                  <a:t>Patch Size: </a:t>
+                </a:r>
+                <a:r>
+                  <a:rPr lang="en-US" dirty="0" smtClean="0"/>
+                  <a:t>7px by 7px by 3 (LAB) for 147 total, original dimensions.  This dimensionality is reduced via PCA.</a:t>
+                </a:r>
+              </a:p>
+              <a:p>
+                <a:pPr marL="457200" lvl="1" indent="0">
+                  <a:spcBef>
+                    <a:spcPts val="1000"/>
+                  </a:spcBef>
+                  <a:buNone/>
+                </a:pPr>
+                <a:endParaRPr lang="en-US" dirty="0" smtClean="0"/>
+              </a:p>
+              <a:p>
+                <a:pPr>
+                  <a:spcBef>
+                    <a:spcPts val="1000"/>
+                  </a:spcBef>
+                </a:pPr>
+                <a:r>
+                  <a:rPr lang="en-US" b="1" dirty="0" smtClean="0"/>
+                  <a:t>Clustering the Patches</a:t>
+                </a:r>
+              </a:p>
+              <a:p>
+                <a:pPr lvl="1">
+                  <a:spcBef>
+                    <a:spcPts val="1000"/>
+                  </a:spcBef>
+                </a:pPr>
+                <a:r>
+                  <a:rPr lang="en-US" i="1" dirty="0">
+                    <a:solidFill>
+                      <a:srgbClr val="006600"/>
+                    </a:solidFill>
+                  </a:rPr>
+                  <a:t>Step #1: </a:t>
+                </a:r>
+                <a:r>
+                  <a:rPr lang="en-US" dirty="0" smtClean="0"/>
+                  <a:t>Cluster each image’s patches into </a:t>
+                </a:r>
+                <a14:m>
+                  <m:oMath xmlns:m="http://schemas.openxmlformats.org/officeDocument/2006/math">
+                    <m:r>
+                      <a:rPr lang="en-US" b="0" i="1" smtClean="0">
+                        <a:latin typeface="Cambria Math"/>
+                      </a:rPr>
+                      <m:t>𝐿</m:t>
+                    </m:r>
+                  </m:oMath>
+                </a14:m>
+                <a:r>
+                  <a:rPr lang="en-US" dirty="0" smtClean="0"/>
+                  <a:t> (e.g. 20) centroids.</a:t>
+                </a:r>
+              </a:p>
+              <a:p>
+                <a:pPr lvl="1">
+                  <a:spcBef>
+                    <a:spcPts val="1000"/>
+                  </a:spcBef>
+                </a:pPr>
+                <a:r>
+                  <a:rPr lang="en-US" i="1" dirty="0" smtClean="0">
+                    <a:solidFill>
+                      <a:srgbClr val="006600"/>
+                    </a:solidFill>
+                  </a:rPr>
+                  <a:t>Step #2</a:t>
+                </a:r>
+                <a:r>
+                  <a:rPr lang="en-US" dirty="0" smtClean="0"/>
+                  <a:t>: Re-cluster </a:t>
+                </a:r>
+                <a14:m>
+                  <m:oMath xmlns:m="http://schemas.openxmlformats.org/officeDocument/2006/math">
+                    <m:r>
+                      <a:rPr lang="en-US" b="0" i="1" smtClean="0">
+                        <a:latin typeface="Cambria Math"/>
+                      </a:rPr>
+                      <m:t>𝐿</m:t>
+                    </m:r>
+                  </m:oMath>
+                </a14:m>
+                <a:r>
+                  <a:rPr lang="en-US" dirty="0" smtClean="0"/>
+                  <a:t> centroids from all images into </a:t>
+                </a:r>
+                <a14:m>
+                  <m:oMath xmlns:m="http://schemas.openxmlformats.org/officeDocument/2006/math">
+                    <m:r>
+                      <a:rPr lang="en-US" b="0" i="1" smtClean="0">
+                        <a:latin typeface="Cambria Math"/>
+                      </a:rPr>
+                      <m:t>𝑁</m:t>
+                    </m:r>
+                  </m:oMath>
+                </a14:m>
+                <a:r>
+                  <a:rPr lang="en-US" dirty="0" smtClean="0"/>
+                  <a:t> (e.g. 200) centroids. </a:t>
+                </a:r>
+              </a:p>
+              <a:p>
+                <a:pPr>
+                  <a:spcBef>
+                    <a:spcPts val="1000"/>
+                  </a:spcBef>
+                </a:pPr>
+                <a:endParaRPr lang="en-US" dirty="0" smtClean="0"/>
+              </a:p>
+              <a:p>
+                <a:pPr>
+                  <a:spcBef>
+                    <a:spcPts val="1000"/>
+                  </a:spcBef>
+                </a:pPr>
+                <a:r>
+                  <a:rPr lang="en-US" b="1" dirty="0" smtClean="0"/>
+                  <a:t>Creating the Histogram: </a:t>
+                </a:r>
+                <a:r>
+                  <a:rPr lang="en-US" dirty="0" smtClean="0"/>
+                  <a:t>For a given image, assign each patch to its closest centroid.  </a:t>
+                </a:r>
+              </a:p>
+            </p:txBody>
+          </p:sp>
+        </mc:Choice>
+        <mc:Fallback>
+          <p:sp>
+            <p:nvSpPr>
+              <p:cNvPr id="3" name="Content Placeholder 2"/>
+              <p:cNvSpPr>
+                <a:spLocks noGrp="1" noRot="1" noChangeAspect="1" noMove="1" noResize="1" noEditPoints="1" noAdjustHandles="1" noChangeArrowheads="1" noChangeShapeType="1" noTextEdit="1"/>
+              </p:cNvSpPr>
+              <p:nvPr>
+                <p:ph idx="1"/>
+              </p:nvPr>
+            </p:nvSpPr>
+            <p:spPr>
+              <a:blipFill rotWithShape="1">
+                <a:blip r:embed="rId2"/>
+                <a:stretch>
+                  <a:fillRect l="-963" t="-949" r="-444"/>
+                </a:stretch>
+              </a:blipFill>
+            </p:spPr>
+            <p:txBody>
+              <a:bodyPr/>
+              <a:lstStyle/>
+              <a:p>
+                <a:r>
+                  <a:rPr lang="en-US">
+                    <a:noFill/>
+                  </a:rPr>
+                  <a:t> </a:t>
+                </a:r>
+              </a:p>
+            </p:txBody>
+          </p:sp>
+        </mc:Fallback>
+      </mc:AlternateContent>
+    </p:spTree>
+    <p:extLst>
+      <p:ext uri="{BB962C8B-B14F-4D97-AF65-F5344CB8AC3E}">
+        <p14:creationId xmlns:p14="http://schemas.microsoft.com/office/powerpoint/2010/main" val="1855633438"/>
+      </p:ext>
+    </p:extLst>
+  </p:cSld>
+  <p:clrMapOvr>
+    <a:masterClrMapping/>
+  </p:clrMapOvr>
+  <p:timing>
+    <p:tnLst>
+      <p:par>
+        <p:cTn id="1" dur="indefinite" restart="never" nodeType="tmRoot"/>
+      </p:par>
+    </p:tnLst>
+  </p:timing>
+</p:sld>
+</file>
+
+<file path=ppt/slides/slide21.xml><?xml version="1.0" encoding="utf-8"?>
+<p:sld xmlns:a="http://schemas.openxmlformats.org/drawingml/2006/main" xmlns:r="http://schemas.openxmlformats.org/officeDocument/2006/relationships" xmlns:p="http://schemas.openxmlformats.org/presentationml/2006/main">
+  <p:cSld>
+    <p:spTree>
+      <p:nvGrpSpPr>
+        <p:cNvPr id="1" name=""/>
+        <p:cNvGrpSpPr/>
+        <p:nvPr/>
+      </p:nvGrpSpPr>
+      <p:grpSpPr>
+        <a:xfrm>
+          <a:off x="0" y="0"/>
+          <a:ext cx="0" cy="0"/>
+          <a:chOff x="0" y="0"/>
+          <a:chExt cx="0" cy="0"/>
+        </a:xfrm>
+      </p:grpSpPr>
+      <p:sp>
+        <p:nvSpPr>
+          <p:cNvPr id="2" name="Title 1"/>
+          <p:cNvSpPr>
+            <a:spLocks noGrp="1"/>
+          </p:cNvSpPr>
+          <p:nvPr>
+            <p:ph type="title"/>
+          </p:nvPr>
+        </p:nvSpPr>
+        <p:spPr>
+          <a:xfrm>
+            <a:off x="2105024" y="76200"/>
+            <a:ext cx="7038975" cy="550863"/>
+          </a:xfrm>
+        </p:spPr>
+        <p:txBody>
+          <a:bodyPr>
+            <a:noAutofit/>
+          </a:bodyPr>
+          <a:lstStyle/>
+          <a:p>
+            <a:r>
+              <a:rPr lang="en-US" sz="2400" dirty="0" smtClean="0"/>
+              <a:t>“Dense and Noisy” – Generating the Low Res. Image</a:t>
+            </a:r>
+            <a:endParaRPr lang="en-US" sz="2400" dirty="0"/>
+          </a:p>
+        </p:txBody>
+      </p:sp>
+      <p:sp>
+        <p:nvSpPr>
+          <p:cNvPr id="3" name="Content Placeholder 2"/>
+          <p:cNvSpPr>
+            <a:spLocks noGrp="1"/>
+          </p:cNvSpPr>
+          <p:nvPr>
+            <p:ph idx="1"/>
+          </p:nvPr>
+        </p:nvSpPr>
+        <p:spPr/>
+        <p:txBody>
+          <a:bodyPr/>
+          <a:lstStyle/>
+          <a:p>
+            <a:r>
+              <a:rPr lang="en-US" b="1" dirty="0" smtClean="0"/>
+              <a:t>Theoretical Motivation: </a:t>
+            </a:r>
+            <a:r>
+              <a:rPr lang="en-US" dirty="0" smtClean="0"/>
+              <a:t>Different colors are more likely to be at different places in an image.</a:t>
+            </a:r>
+          </a:p>
+          <a:p>
+            <a:pPr lvl="1"/>
+            <a:r>
+              <a:rPr lang="en-US" i="1" dirty="0" smtClean="0">
+                <a:solidFill>
+                  <a:srgbClr val="006600"/>
+                </a:solidFill>
+              </a:rPr>
+              <a:t>Example</a:t>
+            </a:r>
+            <a:r>
+              <a:rPr lang="en-US" b="1" dirty="0" smtClean="0"/>
+              <a:t>:</a:t>
+            </a:r>
+            <a:r>
+              <a:rPr lang="en-US" dirty="0" smtClean="0"/>
+              <a:t> Blue (sky) is more likely to be towards the top of the image while brown (soil) tends to be in the image foreground.</a:t>
+            </a:r>
+          </a:p>
+          <a:p>
+            <a:endParaRPr lang="en-US" dirty="0" smtClean="0"/>
+          </a:p>
+          <a:p>
+            <a:r>
+              <a:rPr lang="en-US" b="1" dirty="0" smtClean="0"/>
+              <a:t>Mapping Bins to the Image</a:t>
+            </a:r>
+            <a:r>
+              <a:rPr lang="en-US" dirty="0" smtClean="0"/>
+              <a:t>: Use the training set to generate probability density maps for each histogram bin.</a:t>
+            </a:r>
+          </a:p>
+          <a:p>
+            <a:endParaRPr lang="en-US" dirty="0"/>
+          </a:p>
+          <a:p>
+            <a:r>
+              <a:rPr lang="en-US" b="1" dirty="0" smtClean="0"/>
+              <a:t>Using the Histogram to Create the Low Resolution Image</a:t>
+            </a:r>
+            <a:r>
+              <a:rPr lang="en-US" dirty="0" smtClean="0"/>
+              <a:t>: Use a trained, linear regression function to map a bag of pieces histogram to the training images (i.e. use prior knowledge).</a:t>
+            </a:r>
+            <a:endParaRPr lang="en-US" dirty="0"/>
+          </a:p>
+        </p:txBody>
+      </p:sp>
+    </p:spTree>
+    <p:extLst>
+      <p:ext uri="{BB962C8B-B14F-4D97-AF65-F5344CB8AC3E}">
+        <p14:creationId xmlns:p14="http://schemas.microsoft.com/office/powerpoint/2010/main" val="58278014"/>
+      </p:ext>
+    </p:extLst>
+  </p:cSld>
+  <p:clrMapOvr>
+    <a:masterClrMapping/>
+  </p:clrMapOvr>
+  <p:timing>
+    <p:tnLst>
+      <p:par>
+        <p:cTn id="1" dur="indefinite" restart="never" nodeType="tmRoot"/>
+      </p:par>
+    </p:tnLst>
+  </p:timing>
+</p:sld>
+</file>
+
+<file path=ppt/slides/slide22.xml><?xml version="1.0" encoding="utf-8"?>
+<p:sld xmlns:a="http://schemas.openxmlformats.org/drawingml/2006/main" xmlns:r="http://schemas.openxmlformats.org/officeDocument/2006/relationships" xmlns:p="http://schemas.openxmlformats.org/presentationml/2006/main">
+  <p:cSld>
+    <p:spTree>
+      <p:nvGrpSpPr>
+        <p:cNvPr id="1" name=""/>
+        <p:cNvGrpSpPr/>
+        <p:nvPr/>
+      </p:nvGrpSpPr>
+      <p:grpSpPr>
+        <a:xfrm>
+          <a:off x="0" y="0"/>
+          <a:ext cx="0" cy="0"/>
+          <a:chOff x="0" y="0"/>
+          <a:chExt cx="0" cy="0"/>
+        </a:xfrm>
+      </p:grpSpPr>
+      <p:sp>
+        <p:nvSpPr>
+          <p:cNvPr id="2" name="Title 1"/>
+          <p:cNvSpPr>
+            <a:spLocks noGrp="1"/>
+          </p:cNvSpPr>
+          <p:nvPr>
+            <p:ph type="title"/>
+          </p:nvPr>
+        </p:nvSpPr>
+        <p:spPr/>
+        <p:txBody>
+          <a:bodyPr>
+            <a:normAutofit fontScale="90000"/>
+          </a:bodyPr>
+          <a:lstStyle/>
+          <a:p>
+            <a:r>
+              <a:rPr lang="en-US" dirty="0" smtClean="0"/>
               <a:t>“Dense and Noisy” Results</a:t>
             </a:r>
             <a:endParaRPr lang="en-US" dirty="0"/>
@@ -6106,7 +7978,7 @@
 </p:sld>
 </file>
 
-<file path=ppt/slides/slide19.xml><?xml version="1.0" encoding="utf-8"?>
+<file path=ppt/slides/slide23.xml><?xml version="1.0" encoding="utf-8"?>
 <p:sld xmlns:a="http://schemas.openxmlformats.org/drawingml/2006/main" xmlns:r="http://schemas.openxmlformats.org/officeDocument/2006/relationships" xmlns:p="http://schemas.openxmlformats.org/presentationml/2006/main">
   <p:cSld>
     <p:spTree>
@@ -6642,7 +8514,7 @@
 </p:sld>
 </file>
 
-<file path=ppt/slides/slide2.xml><?xml version="1.0" encoding="utf-8"?>
+<file path=ppt/slides/slide24.xml><?xml version="1.0" encoding="utf-8"?>
 <p:sld xmlns:a="http://schemas.openxmlformats.org/drawingml/2006/main" xmlns:r="http://schemas.openxmlformats.org/officeDocument/2006/relationships" xmlns:p="http://schemas.openxmlformats.org/presentationml/2006/main">
   <p:cSld>
     <p:spTree>
@@ -6678,133 +8550,249 @@
           <a:p>
             <a:r>
               <a:rPr lang="en-US" dirty="0" smtClean="0"/>
-              <a:t>Introduction</a:t>
+              <a:t>“Sparse and Accurate”</a:t>
             </a:r>
             <a:endParaRPr lang="en-US" dirty="0"/>
           </a:p>
         </p:txBody>
       </p:sp>
-      <p:sp>
-        <p:nvSpPr>
-          <p:cNvPr id="3" name="Content Placeholder 2"/>
-          <p:cNvSpPr>
-            <a:spLocks noGrp="1"/>
-          </p:cNvSpPr>
-          <p:nvPr>
-            <p:ph idx="1"/>
-          </p:nvPr>
-        </p:nvSpPr>
-        <p:spPr/>
-        <p:txBody>
-          <a:bodyPr/>
-          <a:lstStyle/>
-          <a:p>
-            <a:r>
-              <a:rPr lang="en-US" dirty="0" smtClean="0"/>
-              <a:t>“Jigsaw </a:t>
-            </a:r>
-            <a:r>
-              <a:rPr lang="en-US" dirty="0"/>
-              <a:t>Puzzle Problem”</a:t>
-            </a:r>
-          </a:p>
-          <a:p>
-            <a:pPr lvl="1"/>
-            <a:r>
-              <a:rPr lang="en-US" b="1" dirty="0"/>
-              <a:t>Problem Statement: </a:t>
-            </a:r>
-            <a:r>
-              <a:rPr lang="en-US" dirty="0"/>
-              <a:t>Reconstruct an image from a set of image </a:t>
-            </a:r>
-            <a:r>
-              <a:rPr lang="en-US" dirty="0" smtClean="0"/>
-              <a:t>patches</a:t>
-            </a:r>
-          </a:p>
-          <a:p>
-            <a:pPr lvl="1"/>
-            <a:r>
-              <a:rPr lang="en-US" b="1" dirty="0"/>
-              <a:t>Problem Complexity: </a:t>
-            </a:r>
-            <a:r>
-              <a:rPr lang="en-US" dirty="0"/>
-              <a:t>NP-Complete when pairwise affinity of pieces is unreliable [1]</a:t>
-            </a:r>
-          </a:p>
-          <a:p>
-            <a:pPr marL="0" indent="0">
-              <a:buNone/>
-            </a:pPr>
-            <a:endParaRPr lang="en-US" dirty="0" smtClean="0"/>
-          </a:p>
-          <a:p>
-            <a:r>
-              <a:rPr lang="en-US" b="1" dirty="0"/>
-              <a:t>Problem Formulation</a:t>
-            </a:r>
-            <a:r>
-              <a:rPr lang="en-US" dirty="0"/>
-              <a:t>: Set of square, non-overlapping patches</a:t>
-            </a:r>
-          </a:p>
-          <a:p>
-            <a:pPr lvl="1"/>
-            <a:r>
-              <a:rPr lang="en-US" dirty="0"/>
-              <a:t>This </a:t>
-            </a:r>
-            <a:r>
-              <a:rPr lang="en-US" dirty="0" smtClean="0"/>
-              <a:t>specific type </a:t>
-            </a:r>
-            <a:r>
-              <a:rPr lang="en-US" dirty="0"/>
-              <a:t>of puzzle is known as a “jig swap puzzle” [7]</a:t>
-            </a:r>
-          </a:p>
-          <a:p>
-            <a:pPr lvl="1"/>
-            <a:r>
-              <a:rPr lang="en-US" i="1" dirty="0"/>
-              <a:t>Variation of the Problem</a:t>
-            </a:r>
-            <a:r>
-              <a:rPr lang="en-US" dirty="0"/>
-              <a:t>: Allow/disallow patch </a:t>
-            </a:r>
-            <a:r>
-              <a:rPr lang="en-US" dirty="0" smtClean="0"/>
-              <a:t>rotation</a:t>
-            </a:r>
-          </a:p>
-          <a:p>
-            <a:pPr lvl="1"/>
-            <a:endParaRPr lang="en-US" dirty="0"/>
-          </a:p>
-          <a:p>
-            <a:r>
-              <a:rPr lang="en-US" b="1" dirty="0"/>
-              <a:t>A Key Difference with Standard Jigsaw Puzzle Solving: </a:t>
-            </a:r>
-            <a:r>
-              <a:rPr lang="en-US" dirty="0"/>
-              <a:t>The source image you are trying to reconstruct is unknown</a:t>
-            </a:r>
-            <a:r>
-              <a:rPr lang="en-US" dirty="0" smtClean="0"/>
-              <a:t>.</a:t>
-            </a:r>
-            <a:endParaRPr lang="en-US" dirty="0"/>
-          </a:p>
-        </p:txBody>
-      </p:sp>
+      <mc:AlternateContent xmlns:mc="http://schemas.openxmlformats.org/markup-compatibility/2006">
+        <mc:Choice xmlns:a14="http://schemas.microsoft.com/office/drawing/2010/main" Requires="a14">
+          <p:sp>
+            <p:nvSpPr>
+              <p:cNvPr id="3" name="Content Placeholder 2"/>
+              <p:cNvSpPr>
+                <a:spLocks noGrp="1"/>
+              </p:cNvSpPr>
+              <p:nvPr>
+                <p:ph idx="1"/>
+              </p:nvPr>
+            </p:nvSpPr>
+            <p:spPr>
+              <a:xfrm>
+                <a:off x="457200" y="989012"/>
+                <a:ext cx="8229600" cy="5419407"/>
+              </a:xfrm>
+            </p:spPr>
+            <p:txBody>
+              <a:bodyPr>
+                <a:normAutofit fontScale="77500" lnSpcReduction="20000"/>
+              </a:bodyPr>
+              <a:lstStyle/>
+              <a:p>
+                <a:pPr>
+                  <a:lnSpc>
+                    <a:spcPct val="130000"/>
+                  </a:lnSpc>
+                </a:pPr>
+                <a:r>
+                  <a:rPr lang="en-US" dirty="0" smtClean="0"/>
+                  <a:t>Proposed by Cho </a:t>
+                </a:r>
+                <a:r>
+                  <a:rPr lang="en-US" i="1" dirty="0" smtClean="0"/>
+                  <a:t>et. al. </a:t>
+                </a:r>
+                <a:r>
+                  <a:rPr lang="en-US" dirty="0" smtClean="0"/>
+                  <a:t>in [7] </a:t>
+                </a:r>
+              </a:p>
+              <a:p>
+                <a:pPr>
+                  <a:lnSpc>
+                    <a:spcPct val="130000"/>
+                  </a:lnSpc>
+                </a:pPr>
+                <a:endParaRPr lang="en-US" b="1" dirty="0"/>
+              </a:p>
+              <a:p>
+                <a:pPr>
+                  <a:lnSpc>
+                    <a:spcPct val="130000"/>
+                  </a:lnSpc>
+                </a:pPr>
+                <a:r>
+                  <a:rPr lang="en-US" b="1" dirty="0" smtClean="0"/>
+                  <a:t>Common Human Approach to Solving Puzzles</a:t>
+                </a:r>
+                <a:r>
+                  <a:rPr lang="en-US" dirty="0" smtClean="0"/>
+                  <a:t>: “Outside-in”</a:t>
+                </a:r>
+              </a:p>
+              <a:p>
+                <a:pPr lvl="1">
+                  <a:lnSpc>
+                    <a:spcPct val="130000"/>
+                  </a:lnSpc>
+                </a:pPr>
+                <a:r>
+                  <a:rPr lang="en-US" dirty="0" smtClean="0"/>
+                  <a:t>Find the puzzle’s four corner pieces.</a:t>
+                </a:r>
+              </a:p>
+              <a:p>
+                <a:pPr lvl="1">
+                  <a:lnSpc>
+                    <a:spcPct val="130000"/>
+                  </a:lnSpc>
+                </a:pPr>
+                <a:r>
+                  <a:rPr lang="en-US" dirty="0" smtClean="0"/>
+                  <a:t>Build from the corner pieces until all four sections converge.</a:t>
+                </a:r>
+              </a:p>
+              <a:p>
+                <a:pPr>
+                  <a:lnSpc>
+                    <a:spcPct val="130000"/>
+                  </a:lnSpc>
+                </a:pPr>
+                <a:endParaRPr lang="en-US" dirty="0"/>
+              </a:p>
+              <a:p>
+                <a:pPr>
+                  <a:lnSpc>
+                    <a:spcPct val="130000"/>
+                  </a:lnSpc>
+                </a:pPr>
+                <a:r>
+                  <a:rPr lang="en-US" dirty="0" smtClean="0"/>
+                  <a:t>“Sparse and accurate” is based off the “outside-in” technique.</a:t>
+                </a:r>
+              </a:p>
+              <a:p>
+                <a:pPr lvl="1">
+                  <a:lnSpc>
+                    <a:spcPct val="130000"/>
+                  </a:lnSpc>
+                </a:pPr>
+                <a:r>
+                  <a:rPr lang="en-US" b="1" dirty="0" smtClean="0"/>
+                  <a:t>Definition on an “Anchor Patch”</a:t>
+                </a:r>
+                <a:r>
+                  <a:rPr lang="en-US" dirty="0" smtClean="0"/>
+                  <a:t>: A puzzle patch that is placed in its correct location and orientation.</a:t>
+                </a:r>
+              </a:p>
+              <a:p>
+                <a:pPr lvl="1">
+                  <a:lnSpc>
+                    <a:spcPct val="130000"/>
+                  </a:lnSpc>
+                </a:pPr>
+                <a:r>
+                  <a:rPr lang="en-US" b="1" dirty="0" smtClean="0"/>
+                  <a:t>Summary of the Approach:</a:t>
+                </a:r>
+                <a:r>
+                  <a:rPr lang="en-US" dirty="0" smtClean="0"/>
+                  <a:t> Place a set of </a:t>
+                </a:r>
+                <a14:m>
+                  <m:oMath xmlns:m="http://schemas.openxmlformats.org/officeDocument/2006/math">
+                    <m:r>
+                      <a:rPr lang="en-US" b="0" i="1" smtClean="0">
+                        <a:latin typeface="Cambria Math"/>
+                      </a:rPr>
+                      <m:t>𝑁</m:t>
+                    </m:r>
+                  </m:oMath>
+                </a14:m>
+                <a:r>
+                  <a:rPr lang="en-US" dirty="0" smtClean="0"/>
+                  <a:t> anchor patches and then solve the puzzle.</a:t>
+                </a:r>
+              </a:p>
+              <a:p>
+                <a:pPr marL="457200" lvl="1" indent="0">
+                  <a:lnSpc>
+                    <a:spcPct val="130000"/>
+                  </a:lnSpc>
+                  <a:buNone/>
+                </a:pPr>
+                <a:endParaRPr lang="en-US" dirty="0" smtClean="0"/>
+              </a:p>
+              <a:p>
+                <a:pPr>
+                  <a:lnSpc>
+                    <a:spcPct val="130000"/>
+                  </a:lnSpc>
+                </a:pPr>
+                <a:r>
+                  <a:rPr lang="en-US" dirty="0" smtClean="0"/>
+                  <a:t>Two most important criteria of anchor patches</a:t>
+                </a:r>
+              </a:p>
+              <a:p>
+                <a:pPr lvl="1">
+                  <a:lnSpc>
+                    <a:spcPct val="130000"/>
+                  </a:lnSpc>
+                </a:pPr>
+                <a:r>
+                  <a:rPr lang="en-US" dirty="0" smtClean="0"/>
+                  <a:t>Quantity</a:t>
+                </a:r>
+              </a:p>
+              <a:p>
+                <a:pPr lvl="1">
+                  <a:lnSpc>
+                    <a:spcPct val="130000"/>
+                  </a:lnSpc>
+                </a:pPr>
+                <a:r>
+                  <a:rPr lang="en-US" dirty="0" smtClean="0"/>
+                  <a:t>Uniform Spatial Distribution</a:t>
+                </a:r>
+              </a:p>
+            </p:txBody>
+          </p:sp>
+        </mc:Choice>
+        <mc:Fallback>
+          <p:sp>
+            <p:nvSpPr>
+              <p:cNvPr id="3" name="Content Placeholder 2"/>
+              <p:cNvSpPr>
+                <a:spLocks noGrp="1" noRot="1" noChangeAspect="1" noMove="1" noResize="1" noEditPoints="1" noAdjustHandles="1" noChangeArrowheads="1" noChangeShapeType="1" noTextEdit="1"/>
+              </p:cNvSpPr>
+              <p:nvPr>
+                <p:ph idx="1"/>
+              </p:nvPr>
+            </p:nvSpPr>
+            <p:spPr>
+              <a:xfrm>
+                <a:off x="457200" y="989012"/>
+                <a:ext cx="8229600" cy="5419407"/>
+              </a:xfrm>
+              <a:blipFill rotWithShape="1">
+                <a:blip r:embed="rId2"/>
+                <a:stretch>
+                  <a:fillRect l="-519" t="-337"/>
+                </a:stretch>
+              </a:blipFill>
+            </p:spPr>
+            <p:txBody>
+              <a:bodyPr/>
+              <a:lstStyle/>
+              <a:p>
+                <a:r>
+                  <a:rPr lang="en-US">
+                    <a:noFill/>
+                  </a:rPr>
+                  <a:t> </a:t>
+                </a:r>
+              </a:p>
+            </p:txBody>
+          </p:sp>
+        </mc:Fallback>
+      </mc:AlternateContent>
     </p:spTree>
     <p:extLst>
       <p:ext uri="{BB962C8B-B14F-4D97-AF65-F5344CB8AC3E}">
-        <p14:creationId xmlns:p14="http://schemas.microsoft.com/office/powerpoint/2010/main" val="20947063"/>
+        <p14:creationId xmlns:p14="http://schemas.microsoft.com/office/powerpoint/2010/main" val="4118033345"/>
       </p:ext>
     </p:extLst>
   </p:cSld>
@@ -6821,7 +8809,7 @@
 </p:sld>
 </file>
 
-<file path=ppt/slides/slide20.xml><?xml version="1.0" encoding="utf-8"?>
+<file path=ppt/slides/slide25.xml><?xml version="1.0" encoding="utf-8"?>
 <p:sld xmlns:a="http://schemas.openxmlformats.org/drawingml/2006/main" xmlns:r="http://schemas.openxmlformats.org/officeDocument/2006/relationships" xmlns:p="http://schemas.openxmlformats.org/presentationml/2006/main">
   <p:cSld>
     <p:spTree>
@@ -6857,249 +8845,248 @@
           <a:p>
             <a:r>
               <a:rPr lang="en-US" dirty="0" smtClean="0"/>
-              <a:t>“Sparse and Accurate”</a:t>
+              <a:t>Generalized Greedy Algorithm</a:t>
             </a:r>
             <a:endParaRPr lang="en-US" dirty="0"/>
           </a:p>
         </p:txBody>
       </p:sp>
-      <mc:AlternateContent xmlns:mc="http://schemas.openxmlformats.org/markup-compatibility/2006">
-        <mc:Choice xmlns:a14="http://schemas.microsoft.com/office/drawing/2010/main" Requires="a14">
-          <p:sp>
-            <p:nvSpPr>
-              <p:cNvPr id="3" name="Content Placeholder 2"/>
-              <p:cNvSpPr>
-                <a:spLocks noGrp="1"/>
-              </p:cNvSpPr>
-              <p:nvPr>
-                <p:ph idx="1"/>
-              </p:nvPr>
-            </p:nvSpPr>
-            <p:spPr>
-              <a:xfrm>
-                <a:off x="457200" y="989012"/>
-                <a:ext cx="8229600" cy="5419407"/>
-              </a:xfrm>
-            </p:spPr>
-            <p:txBody>
-              <a:bodyPr>
-                <a:normAutofit fontScale="77500" lnSpcReduction="20000"/>
-              </a:bodyPr>
-              <a:lstStyle/>
-              <a:p>
-                <a:pPr>
-                  <a:lnSpc>
-                    <a:spcPct val="130000"/>
-                  </a:lnSpc>
-                </a:pPr>
-                <a:r>
-                  <a:rPr lang="en-US" dirty="0" smtClean="0"/>
-                  <a:t>Proposed by Cho </a:t>
-                </a:r>
-                <a:r>
-                  <a:rPr lang="en-US" i="1" dirty="0" smtClean="0"/>
-                  <a:t>et. al. </a:t>
-                </a:r>
-                <a:r>
-                  <a:rPr lang="en-US" dirty="0" smtClean="0"/>
-                  <a:t>in [7] </a:t>
-                </a:r>
-              </a:p>
-              <a:p>
-                <a:pPr>
-                  <a:lnSpc>
-                    <a:spcPct val="130000"/>
-                  </a:lnSpc>
-                </a:pPr>
-                <a:endParaRPr lang="en-US" b="1" dirty="0"/>
-              </a:p>
-              <a:p>
-                <a:pPr>
-                  <a:lnSpc>
-                    <a:spcPct val="130000"/>
-                  </a:lnSpc>
-                </a:pPr>
-                <a:r>
-                  <a:rPr lang="en-US" b="1" dirty="0" smtClean="0"/>
-                  <a:t>Common Human Approach to Solving Puzzles</a:t>
-                </a:r>
-                <a:r>
-                  <a:rPr lang="en-US" dirty="0" smtClean="0"/>
-                  <a:t>: “Outside-in”</a:t>
-                </a:r>
-              </a:p>
-              <a:p>
-                <a:pPr lvl="1">
-                  <a:lnSpc>
-                    <a:spcPct val="130000"/>
-                  </a:lnSpc>
-                </a:pPr>
-                <a:r>
-                  <a:rPr lang="en-US" dirty="0" smtClean="0"/>
-                  <a:t>Find the puzzle’s four corner pieces.</a:t>
-                </a:r>
-              </a:p>
-              <a:p>
-                <a:pPr lvl="1">
-                  <a:lnSpc>
-                    <a:spcPct val="130000"/>
-                  </a:lnSpc>
-                </a:pPr>
-                <a:r>
-                  <a:rPr lang="en-US" dirty="0" smtClean="0"/>
-                  <a:t>Build from the corner pieces until all four sections converge.</a:t>
-                </a:r>
-              </a:p>
-              <a:p>
-                <a:pPr>
-                  <a:lnSpc>
-                    <a:spcPct val="130000"/>
-                  </a:lnSpc>
-                </a:pPr>
-                <a:endParaRPr lang="en-US" dirty="0"/>
-              </a:p>
-              <a:p>
-                <a:pPr>
-                  <a:lnSpc>
-                    <a:spcPct val="130000"/>
-                  </a:lnSpc>
-                </a:pPr>
-                <a:r>
-                  <a:rPr lang="en-US" dirty="0" smtClean="0"/>
-                  <a:t>“Sparse and accurate” is based off the “outside-in” technique.</a:t>
-                </a:r>
-              </a:p>
-              <a:p>
-                <a:pPr lvl="1">
-                  <a:lnSpc>
-                    <a:spcPct val="130000"/>
-                  </a:lnSpc>
-                </a:pPr>
-                <a:r>
-                  <a:rPr lang="en-US" b="1" dirty="0" smtClean="0"/>
-                  <a:t>Definition on an “Anchor Patch”</a:t>
-                </a:r>
-                <a:r>
-                  <a:rPr lang="en-US" dirty="0" smtClean="0"/>
-                  <a:t>: A puzzle patch that is placed in its correct location and orientation.</a:t>
-                </a:r>
-              </a:p>
-              <a:p>
-                <a:pPr lvl="1">
-                  <a:lnSpc>
-                    <a:spcPct val="130000"/>
-                  </a:lnSpc>
-                </a:pPr>
-                <a:r>
-                  <a:rPr lang="en-US" b="1" dirty="0" smtClean="0"/>
-                  <a:t>Summary of the Approach:</a:t>
-                </a:r>
-                <a:r>
-                  <a:rPr lang="en-US" dirty="0" smtClean="0"/>
-                  <a:t> Place a set of </a:t>
-                </a:r>
-                <a14:m>
-                  <m:oMath xmlns:m="http://schemas.openxmlformats.org/officeDocument/2006/math">
-                    <m:r>
-                      <a:rPr lang="en-US" b="0" i="1" smtClean="0">
-                        <a:latin typeface="Cambria Math"/>
-                      </a:rPr>
-                      <m:t>𝑁</m:t>
-                    </m:r>
-                  </m:oMath>
-                </a14:m>
-                <a:r>
-                  <a:rPr lang="en-US" dirty="0" smtClean="0"/>
-                  <a:t> anchor patches and then solve the puzzle.</a:t>
-                </a:r>
-              </a:p>
-              <a:p>
-                <a:pPr marL="457200" lvl="1" indent="0">
-                  <a:lnSpc>
-                    <a:spcPct val="130000"/>
-                  </a:lnSpc>
-                  <a:buNone/>
-                </a:pPr>
-                <a:endParaRPr lang="en-US" dirty="0" smtClean="0"/>
-              </a:p>
-              <a:p>
-                <a:pPr>
-                  <a:lnSpc>
-                    <a:spcPct val="130000"/>
-                  </a:lnSpc>
-                </a:pPr>
-                <a:r>
-                  <a:rPr lang="en-US" dirty="0" smtClean="0"/>
-                  <a:t>Two most important criteria of anchor patches</a:t>
-                </a:r>
-              </a:p>
-              <a:p>
-                <a:pPr lvl="1">
-                  <a:lnSpc>
-                    <a:spcPct val="130000"/>
-                  </a:lnSpc>
-                </a:pPr>
-                <a:r>
-                  <a:rPr lang="en-US" dirty="0" smtClean="0"/>
-                  <a:t>Quantity</a:t>
-                </a:r>
-              </a:p>
-              <a:p>
-                <a:pPr lvl="1">
-                  <a:lnSpc>
-                    <a:spcPct val="130000"/>
-                  </a:lnSpc>
-                </a:pPr>
-                <a:r>
-                  <a:rPr lang="en-US" dirty="0" smtClean="0"/>
-                  <a:t>Uniform Spatial Distribution</a:t>
-                </a:r>
-              </a:p>
-            </p:txBody>
-          </p:sp>
-        </mc:Choice>
-        <mc:Fallback>
-          <p:sp>
-            <p:nvSpPr>
-              <p:cNvPr id="3" name="Content Placeholder 2"/>
-              <p:cNvSpPr>
-                <a:spLocks noGrp="1" noRot="1" noChangeAspect="1" noMove="1" noResize="1" noEditPoints="1" noAdjustHandles="1" noChangeArrowheads="1" noChangeShapeType="1" noTextEdit="1"/>
-              </p:cNvSpPr>
-              <p:nvPr>
-                <p:ph idx="1"/>
-              </p:nvPr>
-            </p:nvSpPr>
-            <p:spPr>
-              <a:xfrm>
-                <a:off x="457200" y="989012"/>
-                <a:ext cx="8229600" cy="5419407"/>
-              </a:xfrm>
-              <a:blipFill rotWithShape="1">
-                <a:blip r:embed="rId2"/>
-                <a:stretch>
-                  <a:fillRect l="-519" t="-337"/>
-                </a:stretch>
-              </a:blipFill>
-            </p:spPr>
-            <p:txBody>
-              <a:bodyPr/>
-              <a:lstStyle/>
-              <a:p>
-                <a:r>
-                  <a:rPr lang="en-US">
-                    <a:noFill/>
-                  </a:rPr>
-                  <a:t> </a:t>
-                </a:r>
-              </a:p>
-            </p:txBody>
-          </p:sp>
-        </mc:Fallback>
-      </mc:AlternateContent>
+      <p:sp>
+        <p:nvSpPr>
+          <p:cNvPr id="3" name="Content Placeholder 2"/>
+          <p:cNvSpPr>
+            <a:spLocks noGrp="1"/>
+          </p:cNvSpPr>
+          <p:nvPr>
+            <p:ph idx="1"/>
+          </p:nvPr>
+        </p:nvSpPr>
+        <p:spPr/>
+        <p:txBody>
+          <a:bodyPr>
+            <a:normAutofit fontScale="92500" lnSpcReduction="20000"/>
+          </a:bodyPr>
+          <a:lstStyle/>
+          <a:p>
+            <a:pPr>
+              <a:lnSpc>
+                <a:spcPct val="130000"/>
+              </a:lnSpc>
+              <a:spcBef>
+                <a:spcPts val="600"/>
+              </a:spcBef>
+            </a:pPr>
+            <a:r>
+              <a:rPr lang="en-US" dirty="0" smtClean="0"/>
+              <a:t>Proposed by </a:t>
+            </a:r>
+            <a:r>
+              <a:rPr lang="en-US" dirty="0" err="1" smtClean="0"/>
+              <a:t>Pomeranz</a:t>
+            </a:r>
+            <a:r>
+              <a:rPr lang="en-US" dirty="0" smtClean="0"/>
+              <a:t> </a:t>
+            </a:r>
+            <a:r>
+              <a:rPr lang="en-US" i="1" dirty="0" smtClean="0"/>
+              <a:t>et. al.</a:t>
+            </a:r>
+            <a:r>
+              <a:rPr lang="en-US" dirty="0" smtClean="0"/>
+              <a:t> in [10] in 2011.</a:t>
+            </a:r>
+          </a:p>
+          <a:p>
+            <a:pPr>
+              <a:lnSpc>
+                <a:spcPct val="130000"/>
+              </a:lnSpc>
+              <a:spcBef>
+                <a:spcPts val="600"/>
+              </a:spcBef>
+            </a:pPr>
+            <a:endParaRPr lang="en-US" sz="500" dirty="0"/>
+          </a:p>
+          <a:p>
+            <a:pPr>
+              <a:lnSpc>
+                <a:spcPct val="130000"/>
+              </a:lnSpc>
+              <a:spcBef>
+                <a:spcPts val="600"/>
+              </a:spcBef>
+            </a:pPr>
+            <a:r>
+              <a:rPr lang="en-US" sz="2200" b="1" dirty="0" smtClean="0"/>
+              <a:t>Goal: </a:t>
+            </a:r>
+            <a:r>
+              <a:rPr lang="en-US" sz="2200" dirty="0" smtClean="0"/>
+              <a:t>Provide a computational framework for handling square jigsaw puzzles in reasonable time that does not rely on any prior knowledge or human intervention.</a:t>
+            </a:r>
+          </a:p>
+          <a:p>
+            <a:pPr>
+              <a:lnSpc>
+                <a:spcPct val="130000"/>
+              </a:lnSpc>
+              <a:spcBef>
+                <a:spcPts val="600"/>
+              </a:spcBef>
+            </a:pPr>
+            <a:endParaRPr lang="en-US" sz="500" dirty="0" smtClean="0"/>
+          </a:p>
+          <a:p>
+            <a:pPr>
+              <a:lnSpc>
+                <a:spcPct val="130000"/>
+              </a:lnSpc>
+              <a:spcBef>
+                <a:spcPts val="600"/>
+              </a:spcBef>
+            </a:pPr>
+            <a:r>
+              <a:rPr lang="en-US" dirty="0" smtClean="0"/>
+              <a:t>Solver divides the puzzle reconstruction into three </a:t>
+            </a:r>
+            <a:r>
+              <a:rPr lang="en-US" dirty="0" err="1" smtClean="0"/>
+              <a:t>subproblems</a:t>
+            </a:r>
+            <a:r>
+              <a:rPr lang="en-US" dirty="0" smtClean="0"/>
+              <a:t>:</a:t>
+            </a:r>
+          </a:p>
+          <a:p>
+            <a:pPr lvl="1">
+              <a:lnSpc>
+                <a:spcPct val="130000"/>
+              </a:lnSpc>
+              <a:spcBef>
+                <a:spcPts val="600"/>
+              </a:spcBef>
+            </a:pPr>
+            <a:r>
+              <a:rPr lang="en-US" i="1" dirty="0">
+                <a:solidFill>
+                  <a:srgbClr val="006600"/>
+                </a:solidFill>
+              </a:rPr>
+              <a:t>Placement</a:t>
+            </a:r>
+            <a:r>
+              <a:rPr lang="en-US" dirty="0" smtClean="0"/>
+              <a:t>: Given a single patch or partially-placed set of patches, place the remaining patches.</a:t>
+            </a:r>
+          </a:p>
+          <a:p>
+            <a:pPr lvl="1">
+              <a:lnSpc>
+                <a:spcPct val="130000"/>
+              </a:lnSpc>
+              <a:spcBef>
+                <a:spcPts val="600"/>
+              </a:spcBef>
+            </a:pPr>
+            <a:endParaRPr lang="en-US" sz="600" dirty="0"/>
+          </a:p>
+          <a:p>
+            <a:pPr lvl="1">
+              <a:lnSpc>
+                <a:spcPct val="130000"/>
+              </a:lnSpc>
+              <a:spcBef>
+                <a:spcPts val="600"/>
+              </a:spcBef>
+            </a:pPr>
+            <a:r>
+              <a:rPr lang="en-US" i="1" dirty="0">
+                <a:solidFill>
+                  <a:srgbClr val="006600"/>
+                </a:solidFill>
+              </a:rPr>
+              <a:t>Segmentation</a:t>
+            </a:r>
+            <a:r>
+              <a:rPr lang="en-US" dirty="0" smtClean="0"/>
+              <a:t>: Given a fully-placed board, segment the board into subcomponents that are believed to be placed correctly.</a:t>
+            </a:r>
+          </a:p>
+          <a:p>
+            <a:pPr lvl="1">
+              <a:lnSpc>
+                <a:spcPct val="130000"/>
+              </a:lnSpc>
+              <a:spcBef>
+                <a:spcPts val="600"/>
+              </a:spcBef>
+            </a:pPr>
+            <a:endParaRPr lang="en-US" sz="600" dirty="0"/>
+          </a:p>
+          <a:p>
+            <a:pPr lvl="1">
+              <a:lnSpc>
+                <a:spcPct val="130000"/>
+              </a:lnSpc>
+              <a:spcBef>
+                <a:spcPts val="600"/>
+              </a:spcBef>
+            </a:pPr>
+            <a:r>
+              <a:rPr lang="en-US" i="1" dirty="0" smtClean="0">
+                <a:solidFill>
+                  <a:srgbClr val="006600"/>
+                </a:solidFill>
+              </a:rPr>
+              <a:t>Shifting</a:t>
+            </a:r>
+            <a:r>
+              <a:rPr lang="en-US" dirty="0" smtClean="0"/>
+              <a:t>: Given a set of trusted segments, relocate entire segments and individual patches to improve solution quality.</a:t>
+            </a:r>
+            <a:endParaRPr lang="en-US" dirty="0"/>
+          </a:p>
+          <a:p>
+            <a:pPr>
+              <a:lnSpc>
+                <a:spcPct val="130000"/>
+              </a:lnSpc>
+              <a:spcBef>
+                <a:spcPts val="600"/>
+              </a:spcBef>
+            </a:pPr>
+            <a:endParaRPr lang="en-US" dirty="0" smtClean="0"/>
+          </a:p>
+          <a:p>
+            <a:pPr>
+              <a:lnSpc>
+                <a:spcPct val="130000"/>
+              </a:lnSpc>
+              <a:spcBef>
+                <a:spcPts val="600"/>
+              </a:spcBef>
+            </a:pPr>
+            <a:endParaRPr lang="en-US" dirty="0"/>
+          </a:p>
+          <a:p>
+            <a:pPr>
+              <a:lnSpc>
+                <a:spcPct val="130000"/>
+              </a:lnSpc>
+              <a:spcBef>
+                <a:spcPts val="600"/>
+              </a:spcBef>
+            </a:pPr>
+            <a:endParaRPr lang="en-US" dirty="0"/>
+          </a:p>
+        </p:txBody>
+      </p:sp>
     </p:spTree>
     <p:extLst>
       <p:ext uri="{BB962C8B-B14F-4D97-AF65-F5344CB8AC3E}">
-        <p14:creationId xmlns:p14="http://schemas.microsoft.com/office/powerpoint/2010/main" val="4118033345"/>
+        <p14:creationId xmlns:p14="http://schemas.microsoft.com/office/powerpoint/2010/main" val="2483816693"/>
       </p:ext>
     </p:extLst>
   </p:cSld>
@@ -7116,7 +9103,289 @@
 </p:sld>
 </file>
 
-<file path=ppt/slides/slide21.xml><?xml version="1.0" encoding="utf-8"?>
+<file path=ppt/slides/slide26.xml><?xml version="1.0" encoding="utf-8"?>
+<p:sld xmlns:a="http://schemas.openxmlformats.org/drawingml/2006/main" xmlns:r="http://schemas.openxmlformats.org/officeDocument/2006/relationships" xmlns:p="http://schemas.openxmlformats.org/presentationml/2006/main">
+  <p:cSld>
+    <p:spTree>
+      <p:nvGrpSpPr>
+        <p:cNvPr id="1" name=""/>
+        <p:cNvGrpSpPr/>
+        <p:nvPr/>
+      </p:nvGrpSpPr>
+      <p:grpSpPr>
+        <a:xfrm>
+          <a:off x="0" y="0"/>
+          <a:ext cx="0" cy="0"/>
+          <a:chOff x="0" y="0"/>
+          <a:chExt cx="0" cy="0"/>
+        </a:xfrm>
+      </p:grpSpPr>
+      <p:sp>
+        <p:nvSpPr>
+          <p:cNvPr id="2" name="Title 1"/>
+          <p:cNvSpPr>
+            <a:spLocks noGrp="1"/>
+          </p:cNvSpPr>
+          <p:nvPr>
+            <p:ph type="title"/>
+          </p:nvPr>
+        </p:nvSpPr>
+        <p:spPr/>
+        <p:txBody>
+          <a:bodyPr>
+            <a:noAutofit/>
+          </a:bodyPr>
+          <a:lstStyle/>
+          <a:p>
+            <a:r>
+              <a:rPr lang="en-US" sz="2800" dirty="0" smtClean="0"/>
+              <a:t>Overview of the Greedy Placement Phase</a:t>
+            </a:r>
+            <a:endParaRPr lang="en-US" sz="2800" dirty="0"/>
+          </a:p>
+        </p:txBody>
+      </p:sp>
+      <p:sp>
+        <p:nvSpPr>
+          <p:cNvPr id="3" name="Content Placeholder 2"/>
+          <p:cNvSpPr>
+            <a:spLocks noGrp="1"/>
+          </p:cNvSpPr>
+          <p:nvPr>
+            <p:ph idx="1"/>
+          </p:nvPr>
+        </p:nvSpPr>
+        <p:spPr/>
+        <p:txBody>
+          <a:bodyPr>
+            <a:normAutofit fontScale="70000" lnSpcReduction="20000"/>
+          </a:bodyPr>
+          <a:lstStyle/>
+          <a:p>
+            <a:pPr>
+              <a:lnSpc>
+                <a:spcPct val="130000"/>
+              </a:lnSpc>
+              <a:spcBef>
+                <a:spcPts val="600"/>
+              </a:spcBef>
+            </a:pPr>
+            <a:r>
+              <a:rPr lang="en-US" dirty="0" smtClean="0"/>
+              <a:t>Given a partially assembled board (either a single patches or set of patches), continue applying the greedy choice until all patches are placed.</a:t>
+            </a:r>
+          </a:p>
+          <a:p>
+            <a:pPr marL="457200" lvl="1" indent="0">
+              <a:lnSpc>
+                <a:spcPct val="140000"/>
+              </a:lnSpc>
+              <a:spcBef>
+                <a:spcPts val="600"/>
+              </a:spcBef>
+              <a:buNone/>
+            </a:pPr>
+            <a:endParaRPr lang="en-US" sz="400" dirty="0"/>
+          </a:p>
+          <a:p>
+            <a:pPr>
+              <a:lnSpc>
+                <a:spcPct val="130000"/>
+              </a:lnSpc>
+              <a:spcBef>
+                <a:spcPts val="600"/>
+              </a:spcBef>
+            </a:pPr>
+            <a:r>
+              <a:rPr lang="en-US" b="1" dirty="0" smtClean="0"/>
+              <a:t>Overview of the Greedy Choice</a:t>
+            </a:r>
+            <a:r>
+              <a:rPr lang="en-US" dirty="0" smtClean="0"/>
+              <a:t>:</a:t>
+            </a:r>
+          </a:p>
+          <a:p>
+            <a:pPr lvl="1">
+              <a:lnSpc>
+                <a:spcPct val="130000"/>
+              </a:lnSpc>
+              <a:spcBef>
+                <a:spcPts val="600"/>
+              </a:spcBef>
+            </a:pPr>
+            <a:r>
+              <a:rPr lang="en-US" dirty="0" smtClean="0"/>
+              <a:t>Board dimensions are known in advance and fixed</a:t>
+            </a:r>
+          </a:p>
+          <a:p>
+            <a:pPr marL="457200" lvl="1" indent="0">
+              <a:lnSpc>
+                <a:spcPct val="130000"/>
+              </a:lnSpc>
+              <a:spcBef>
+                <a:spcPts val="600"/>
+              </a:spcBef>
+              <a:buNone/>
+            </a:pPr>
+            <a:endParaRPr lang="en-US" sz="500" dirty="0"/>
+          </a:p>
+          <a:p>
+            <a:pPr lvl="1">
+              <a:lnSpc>
+                <a:spcPct val="130000"/>
+              </a:lnSpc>
+              <a:spcBef>
+                <a:spcPts val="600"/>
+              </a:spcBef>
+            </a:pPr>
+            <a:r>
+              <a:rPr lang="en-US" dirty="0" smtClean="0"/>
+              <a:t>Board locations with a higher number of occupied neighbors are preferred as the choice of the next piece is more informed.</a:t>
+            </a:r>
+          </a:p>
+          <a:p>
+            <a:pPr marL="457200" lvl="1" indent="0">
+              <a:lnSpc>
+                <a:spcPct val="130000"/>
+              </a:lnSpc>
+              <a:spcBef>
+                <a:spcPts val="600"/>
+              </a:spcBef>
+              <a:buNone/>
+            </a:pPr>
+            <a:endParaRPr lang="en-US" sz="500" dirty="0" smtClean="0"/>
+          </a:p>
+          <a:p>
+            <a:pPr lvl="1">
+              <a:lnSpc>
+                <a:spcPct val="130000"/>
+              </a:lnSpc>
+              <a:spcBef>
+                <a:spcPts val="600"/>
+              </a:spcBef>
+            </a:pPr>
+            <a:r>
+              <a:rPr lang="en-US" dirty="0" smtClean="0"/>
+              <a:t>Patch selection criteria:</a:t>
+            </a:r>
+          </a:p>
+          <a:p>
+            <a:pPr lvl="2">
+              <a:lnSpc>
+                <a:spcPct val="130000"/>
+              </a:lnSpc>
+              <a:spcBef>
+                <a:spcPts val="600"/>
+              </a:spcBef>
+            </a:pPr>
+            <a:r>
+              <a:rPr lang="en-US" i="1" dirty="0" smtClean="0">
+                <a:solidFill>
+                  <a:srgbClr val="006600"/>
+                </a:solidFill>
+              </a:rPr>
+              <a:t>Primary Criteria</a:t>
+            </a:r>
+            <a:r>
+              <a:rPr lang="en-US" dirty="0" smtClean="0"/>
+              <a:t>: Prefer a “best buddy” first.</a:t>
+            </a:r>
+          </a:p>
+          <a:p>
+            <a:pPr lvl="2">
+              <a:lnSpc>
+                <a:spcPct val="130000"/>
+              </a:lnSpc>
+              <a:spcBef>
+                <a:spcPts val="600"/>
+              </a:spcBef>
+            </a:pPr>
+            <a:r>
+              <a:rPr lang="en-US" i="1" dirty="0" smtClean="0">
+                <a:solidFill>
+                  <a:srgbClr val="006600"/>
+                </a:solidFill>
+              </a:rPr>
+              <a:t>Secondary Criteria</a:t>
+            </a:r>
+            <a:r>
+              <a:rPr lang="en-US" dirty="0" smtClean="0"/>
+              <a:t>: If no or multiple patches satisfy the primary criteria, select the patch with the highest compatibility score.</a:t>
+            </a:r>
+          </a:p>
+          <a:p>
+            <a:pPr lvl="2">
+              <a:lnSpc>
+                <a:spcPct val="130000"/>
+              </a:lnSpc>
+              <a:spcBef>
+                <a:spcPts val="600"/>
+              </a:spcBef>
+            </a:pPr>
+            <a:endParaRPr lang="en-US" dirty="0" smtClean="0"/>
+          </a:p>
+          <a:p>
+            <a:pPr>
+              <a:lnSpc>
+                <a:spcPct val="130000"/>
+              </a:lnSpc>
+              <a:spcBef>
+                <a:spcPts val="600"/>
+              </a:spcBef>
+            </a:pPr>
+            <a:r>
+              <a:rPr lang="en-US" b="1" dirty="0" smtClean="0"/>
+              <a:t>Question: </a:t>
+            </a:r>
+            <a:r>
+              <a:rPr lang="en-US" dirty="0" smtClean="0"/>
+              <a:t>Why is a placer not enough? </a:t>
+            </a:r>
+          </a:p>
+          <a:p>
+            <a:pPr>
+              <a:lnSpc>
+                <a:spcPct val="130000"/>
+              </a:lnSpc>
+              <a:spcBef>
+                <a:spcPts val="600"/>
+              </a:spcBef>
+            </a:pPr>
+            <a:r>
+              <a:rPr lang="en-US" b="1" dirty="0" smtClean="0"/>
+              <a:t>Answer: </a:t>
+            </a:r>
+            <a:r>
+              <a:rPr lang="en-US" dirty="0" smtClean="0"/>
+              <a:t>It works solely on local information.  To get the best results, we must also look at the global solution as a whole.</a:t>
+            </a:r>
+            <a:endParaRPr lang="en-US" dirty="0"/>
+          </a:p>
+        </p:txBody>
+      </p:sp>
+    </p:spTree>
+    <p:extLst>
+      <p:ext uri="{BB962C8B-B14F-4D97-AF65-F5344CB8AC3E}">
+        <p14:creationId xmlns:p14="http://schemas.microsoft.com/office/powerpoint/2010/main" val="260086172"/>
+      </p:ext>
+    </p:extLst>
+  </p:cSld>
+  <p:clrMapOvr>
+    <a:masterClrMapping/>
+  </p:clrMapOvr>
+  <p:timing>
+    <p:tnLst>
+      <p:par>
+        <p:cTn id="1" dur="indefinite" restart="never" nodeType="tmRoot"/>
+      </p:par>
+    </p:tnLst>
+  </p:timing>
+</p:sld>
+</file>
+
+<file path=ppt/slides/slide27.xml><?xml version="1.0" encoding="utf-8"?>
 <p:sld xmlns:a="http://schemas.openxmlformats.org/drawingml/2006/main" xmlns:r="http://schemas.openxmlformats.org/officeDocument/2006/relationships" xmlns:p="http://schemas.openxmlformats.org/presentationml/2006/main">
   <p:cSld>
     <p:spTree>
@@ -7151,8 +9420,12 @@
           <a:lstStyle/>
           <a:p>
             <a:r>
+              <a:rPr lang="en-US" dirty="0" err="1" smtClean="0"/>
+              <a:t>Segmenter</a:t>
+            </a:r>
+            <a:r>
               <a:rPr lang="en-US" dirty="0" smtClean="0"/>
-              <a:t>Loopy Belief Propagation Solver</a:t>
+              <a:t> Phase</a:t>
             </a:r>
             <a:endParaRPr lang="en-US" dirty="0"/>
           </a:p>
@@ -7174,8 +9447,12 @@
           <a:lstStyle/>
           <a:p>
             <a:r>
+              <a:rPr lang="en-US" b="1" dirty="0" smtClean="0"/>
+              <a:t>Definition of “Segments”</a:t>
+            </a:r>
+            <a:r>
               <a:rPr lang="en-US" dirty="0" smtClean="0"/>
-              <a:t>Coupled with the “Dense and Noisy” and “Spare and Accurate” techniques by [7].</a:t>
+              <a:t>: Areas of the puzzle that are assembled correctly.</a:t>
             </a:r>
           </a:p>
           <a:p>
@@ -7183,8 +9460,12 @@
           </a:p>
           <a:p>
             <a:r>
+              <a:rPr lang="en-US" b="1" dirty="0" smtClean="0"/>
+              <a:t>Procedure</a:t>
+            </a:r>
+            <a:r>
               <a:rPr lang="en-US" dirty="0" smtClean="0"/>
-              <a:t>Maximizes a probability function using loopy belief propagation.</a:t>
+              <a:t>: Use random seeds and a segmentation predicate based on the “best buddies” metric, use the region growing segmentation algorithm as described in [15].</a:t>
             </a:r>
           </a:p>
           <a:p>
@@ -7192,8 +9473,16 @@
           </a:p>
           <a:p>
             <a:r>
+              <a:rPr lang="en-US" b="1" dirty="0" smtClean="0"/>
+              <a:t>Accuracy of the </a:t>
+            </a:r>
+            <a:r>
+              <a:rPr lang="en-US" b="1" dirty="0" err="1" smtClean="0"/>
+              <a:t>Segmenter</a:t>
+            </a:r>
+            <a:r>
               <a:rPr lang="en-US" dirty="0" smtClean="0"/>
-              <a:t>Susceptible to local maxima so three random restarts are performed.</a:t>
+              <a:t>: 99.7%</a:t>
             </a:r>
             <a:endParaRPr lang="en-US" dirty="0"/>
           </a:p>
@@ -7202,7 +9491,7 @@
     </p:spTree>
     <p:extLst>
       <p:ext uri="{BB962C8B-B14F-4D97-AF65-F5344CB8AC3E}">
-        <p14:creationId xmlns:p14="http://schemas.microsoft.com/office/powerpoint/2010/main" val="674603872"/>
+        <p14:creationId xmlns:p14="http://schemas.microsoft.com/office/powerpoint/2010/main" val="852581605"/>
       </p:ext>
     </p:extLst>
   </p:cSld>
@@ -7219,7 +9508,229 @@
 </p:sld>
 </file>
 
-<file path=ppt/slides/slide22.xml><?xml version="1.0" encoding="utf-8"?>
+<file path=ppt/slides/slide28.xml><?xml version="1.0" encoding="utf-8"?>
+<p:sld xmlns:a="http://schemas.openxmlformats.org/drawingml/2006/main" xmlns:r="http://schemas.openxmlformats.org/officeDocument/2006/relationships" xmlns:p="http://schemas.openxmlformats.org/presentationml/2006/main">
+  <p:cSld>
+    <p:spTree>
+      <p:nvGrpSpPr>
+        <p:cNvPr id="1" name=""/>
+        <p:cNvGrpSpPr/>
+        <p:nvPr/>
+      </p:nvGrpSpPr>
+      <p:grpSpPr>
+        <a:xfrm>
+          <a:off x="0" y="0"/>
+          <a:ext cx="0" cy="0"/>
+          <a:chOff x="0" y="0"/>
+          <a:chExt cx="0" cy="0"/>
+        </a:xfrm>
+      </p:grpSpPr>
+      <p:sp>
+        <p:nvSpPr>
+          <p:cNvPr id="2" name="Title 1"/>
+          <p:cNvSpPr>
+            <a:spLocks noGrp="1"/>
+          </p:cNvSpPr>
+          <p:nvPr>
+            <p:ph type="title"/>
+          </p:nvPr>
+        </p:nvSpPr>
+        <p:spPr/>
+        <p:txBody>
+          <a:bodyPr>
+            <a:noAutofit/>
+          </a:bodyPr>
+          <a:lstStyle/>
+          <a:p>
+            <a:r>
+              <a:rPr lang="en-US" sz="3200" dirty="0" err="1" smtClean="0"/>
+              <a:t>Pomeranz’s</a:t>
+            </a:r>
+            <a:r>
+              <a:rPr lang="en-US" sz="3200" dirty="0" smtClean="0"/>
+              <a:t> Complete Algorithm</a:t>
+            </a:r>
+            <a:endParaRPr lang="en-US" sz="3200" dirty="0"/>
+          </a:p>
+        </p:txBody>
+      </p:sp>
+      <p:sp>
+        <p:nvSpPr>
+          <p:cNvPr id="3" name="Content Placeholder 2"/>
+          <p:cNvSpPr>
+            <a:spLocks noGrp="1"/>
+          </p:cNvSpPr>
+          <p:nvPr>
+            <p:ph idx="1"/>
+          </p:nvPr>
+        </p:nvSpPr>
+        <p:spPr/>
+        <p:txBody>
+          <a:bodyPr/>
+          <a:lstStyle/>
+          <a:p>
+            <a:pPr>
+              <a:lnSpc>
+                <a:spcPct val="110000"/>
+              </a:lnSpc>
+              <a:spcBef>
+                <a:spcPts val="1800"/>
+              </a:spcBef>
+            </a:pPr>
+            <a:r>
+              <a:rPr lang="en-US" b="1" i="1" dirty="0" smtClean="0">
+                <a:solidFill>
+                  <a:srgbClr val="006600"/>
+                </a:solidFill>
+              </a:rPr>
+              <a:t>Step #1</a:t>
+            </a:r>
+            <a:r>
+              <a:rPr lang="en-US" dirty="0" smtClean="0"/>
+              <a:t>: Select a single puzzle patch as the seed to placement phase.</a:t>
+            </a:r>
+          </a:p>
+          <a:p>
+            <a:pPr>
+              <a:lnSpc>
+                <a:spcPct val="110000"/>
+              </a:lnSpc>
+              <a:spcBef>
+                <a:spcPts val="1800"/>
+              </a:spcBef>
+            </a:pPr>
+            <a:r>
+              <a:rPr lang="en-US" b="1" i="1" dirty="0">
+                <a:solidFill>
+                  <a:srgbClr val="006600"/>
+                </a:solidFill>
+              </a:rPr>
+              <a:t>Step </a:t>
+            </a:r>
+            <a:r>
+              <a:rPr lang="en-US" b="1" i="1" dirty="0">
+                <a:solidFill>
+                  <a:srgbClr val="006600"/>
+                </a:solidFill>
+              </a:rPr>
+              <a:t>#2</a:t>
+            </a:r>
+            <a:r>
+              <a:rPr lang="en-US" dirty="0" smtClean="0"/>
+              <a:t>: Perform the placement phase around the seed.</a:t>
+            </a:r>
+          </a:p>
+          <a:p>
+            <a:pPr>
+              <a:lnSpc>
+                <a:spcPct val="110000"/>
+              </a:lnSpc>
+              <a:spcBef>
+                <a:spcPts val="1800"/>
+              </a:spcBef>
+            </a:pPr>
+            <a:r>
+              <a:rPr lang="en-US" b="1" i="1" dirty="0">
+                <a:solidFill>
+                  <a:srgbClr val="006600"/>
+                </a:solidFill>
+              </a:rPr>
+              <a:t>Step #3</a:t>
+            </a:r>
+            <a:r>
+              <a:rPr lang="en-US" dirty="0" smtClean="0"/>
+              <a:t>: Use the </a:t>
+            </a:r>
+            <a:r>
+              <a:rPr lang="en-US" dirty="0" err="1" smtClean="0"/>
+              <a:t>segmenter</a:t>
+            </a:r>
+            <a:r>
+              <a:rPr lang="en-US" dirty="0" smtClean="0"/>
+              <a:t> to partition the board.</a:t>
+            </a:r>
+          </a:p>
+          <a:p>
+            <a:pPr>
+              <a:lnSpc>
+                <a:spcPct val="110000"/>
+              </a:lnSpc>
+              <a:spcBef>
+                <a:spcPts val="1800"/>
+              </a:spcBef>
+            </a:pPr>
+            <a:r>
+              <a:rPr lang="en-US" b="1" i="1" dirty="0">
+                <a:solidFill>
+                  <a:srgbClr val="006600"/>
+                </a:solidFill>
+              </a:rPr>
+              <a:t>Step #4</a:t>
+            </a:r>
+            <a:r>
+              <a:rPr lang="en-US" dirty="0" smtClean="0"/>
+              <a:t>: Calculate the “best buddies” ratio.  If you are at a local maximum, stop.</a:t>
+            </a:r>
+          </a:p>
+          <a:p>
+            <a:pPr>
+              <a:lnSpc>
+                <a:spcPct val="110000"/>
+              </a:lnSpc>
+              <a:spcBef>
+                <a:spcPts val="1800"/>
+              </a:spcBef>
+            </a:pPr>
+            <a:r>
+              <a:rPr lang="en-US" b="1" i="1" dirty="0">
+                <a:solidFill>
+                  <a:srgbClr val="006600"/>
+                </a:solidFill>
+              </a:rPr>
+              <a:t>Step #5</a:t>
+            </a:r>
+            <a:r>
+              <a:rPr lang="en-US" dirty="0" smtClean="0"/>
+              <a:t>: Select the largest segment from step #3 and use it as the seed of the placement phase.  Return to step #2.</a:t>
+            </a:r>
+          </a:p>
+          <a:p>
+            <a:pPr lvl="1">
+              <a:lnSpc>
+                <a:spcPct val="110000"/>
+              </a:lnSpc>
+              <a:spcBef>
+                <a:spcPts val="1800"/>
+              </a:spcBef>
+            </a:pPr>
+            <a:r>
+              <a:rPr lang="en-US" dirty="0" smtClean="0"/>
+              <a:t>Performing this step is similar to shifting the largest segment.</a:t>
+            </a:r>
+          </a:p>
+        </p:txBody>
+      </p:sp>
+    </p:spTree>
+    <p:extLst>
+      <p:ext uri="{BB962C8B-B14F-4D97-AF65-F5344CB8AC3E}">
+        <p14:creationId xmlns:p14="http://schemas.microsoft.com/office/powerpoint/2010/main" val="2972052715"/>
+      </p:ext>
+    </p:extLst>
+  </p:cSld>
+  <p:clrMapOvr>
+    <a:masterClrMapping/>
+  </p:clrMapOvr>
+  <p:timing>
+    <p:tnLst>
+      <p:par>
+        <p:cTn id="1" dur="indefinite" restart="never" nodeType="tmRoot"/>
+      </p:par>
+    </p:tnLst>
+  </p:timing>
+</p:sld>
+</file>
+
+<file path=ppt/slides/slide29.xml><?xml version="1.0" encoding="utf-8"?>
 <p:sld xmlns:a="http://schemas.openxmlformats.org/drawingml/2006/main" xmlns:r="http://schemas.openxmlformats.org/officeDocument/2006/relationships" xmlns:p="http://schemas.openxmlformats.org/presentationml/2006/main">
   <p:cSld>
     <p:spTree>
@@ -7255,131 +9766,6 @@
           <a:p>
             <a:r>
               <a:rPr lang="en-US" dirty="0" smtClean="0"/>
-              <a:t>Generalized Greedy Algorithm</a:t>
-            </a:r>
-            <a:endParaRPr lang="en-US" dirty="0"/>
-          </a:p>
-        </p:txBody>
-      </p:sp>
-      <p:sp>
-        <p:nvSpPr>
-          <p:cNvPr id="3" name="Content Placeholder 2"/>
-          <p:cNvSpPr>
-            <a:spLocks noGrp="1"/>
-          </p:cNvSpPr>
-          <p:nvPr>
-            <p:ph idx="1"/>
-          </p:nvPr>
-        </p:nvSpPr>
-        <p:spPr/>
-        <p:txBody>
-          <a:bodyPr/>
-          <a:lstStyle/>
-          <a:p>
-            <a:r>
-              <a:rPr lang="en-US" dirty="0" smtClean="0"/>
-              <a:t>Proposed by </a:t>
-            </a:r>
-            <a:r>
-              <a:rPr lang="en-US" dirty="0" err="1" smtClean="0"/>
-              <a:t>Pomeranz</a:t>
-            </a:r>
-            <a:r>
-              <a:rPr lang="en-US" dirty="0" smtClean="0"/>
-              <a:t> </a:t>
-            </a:r>
-            <a:r>
-              <a:rPr lang="en-US" i="1" dirty="0" smtClean="0"/>
-              <a:t>et. al.</a:t>
-            </a:r>
-            <a:r>
-              <a:rPr lang="en-US" dirty="0" smtClean="0"/>
-              <a:t> in [10] in 2011.</a:t>
-            </a:r>
-          </a:p>
-          <a:p>
-            <a:endParaRPr lang="en-US" dirty="0"/>
-          </a:p>
-          <a:p>
-            <a:r>
-              <a:rPr lang="en-US" b="1" dirty="0" smtClean="0"/>
-              <a:t>Goal: </a:t>
-            </a:r>
-            <a:r>
-              <a:rPr lang="en-US" dirty="0" smtClean="0"/>
-              <a:t>Provide a computational framework for handling square jigsaw puzzles in reasonable time that does not rely on any prior knowledge or human intervention.</a:t>
-            </a:r>
-          </a:p>
-          <a:p>
-            <a:endParaRPr lang="en-US" dirty="0"/>
-          </a:p>
-          <a:p>
-            <a:endParaRPr lang="en-US" dirty="0" smtClean="0"/>
-          </a:p>
-          <a:p>
-            <a:endParaRPr lang="en-US" dirty="0"/>
-          </a:p>
-          <a:p>
-            <a:endParaRPr lang="en-US" dirty="0"/>
-          </a:p>
-        </p:txBody>
-      </p:sp>
-    </p:spTree>
-    <p:extLst>
-      <p:ext uri="{BB962C8B-B14F-4D97-AF65-F5344CB8AC3E}">
-        <p14:creationId xmlns:p14="http://schemas.microsoft.com/office/powerpoint/2010/main" val="2483816693"/>
-      </p:ext>
-    </p:extLst>
-  </p:cSld>
-  <p:clrMapOvr>
-    <a:masterClrMapping/>
-  </p:clrMapOvr>
-  <p:timing>
-    <p:tnLst>
-      <p:par>
-        <p:cTn id="1" dur="indefinite" restart="never" nodeType="tmRoot"/>
-      </p:par>
-    </p:tnLst>
-  </p:timing>
-</p:sld>
-</file>
-
-<file path=ppt/slides/slide23.xml><?xml version="1.0" encoding="utf-8"?>
-<p:sld xmlns:a="http://schemas.openxmlformats.org/drawingml/2006/main" xmlns:r="http://schemas.openxmlformats.org/officeDocument/2006/relationships" xmlns:p="http://schemas.openxmlformats.org/presentationml/2006/main">
-  <p:cSld>
-    <p:spTree>
-      <p:nvGrpSpPr>
-        <p:cNvPr id="1" name=""/>
-        <p:cNvGrpSpPr/>
-        <p:nvPr/>
-      </p:nvGrpSpPr>
-      <p:grpSpPr>
-        <a:xfrm>
-          <a:off x="0" y="0"/>
-          <a:ext cx="0" cy="0"/>
-          <a:chOff x="0" y="0"/>
-          <a:chExt cx="0" cy="0"/>
-        </a:xfrm>
-      </p:grpSpPr>
-      <p:sp>
-        <p:nvSpPr>
-          <p:cNvPr id="2" name="Title 1"/>
-          <p:cNvSpPr>
-            <a:spLocks noGrp="1"/>
-          </p:cNvSpPr>
-          <p:nvPr>
-            <p:ph type="title"/>
-          </p:nvPr>
-        </p:nvSpPr>
-        <p:spPr/>
-        <p:txBody>
-          <a:bodyPr>
-            <a:normAutofit fontScale="90000"/>
-          </a:bodyPr>
-          <a:lstStyle/>
-          <a:p>
-            <a:r>
-              <a:rPr lang="en-US" dirty="0" smtClean="0"/>
               <a:t>Measuring Solution Quality</a:t>
             </a:r>
             <a:endParaRPr lang="en-US" dirty="0"/>
@@ -7549,7 +9935,144 @@
 </p:sld>
 </file>
 
-<file path=ppt/slides/slide24.xml><?xml version="1.0" encoding="utf-8"?>
+<file path=ppt/slides/slide3.xml><?xml version="1.0" encoding="utf-8"?>
+<p:sld xmlns:a="http://schemas.openxmlformats.org/drawingml/2006/main" xmlns:r="http://schemas.openxmlformats.org/officeDocument/2006/relationships" xmlns:p="http://schemas.openxmlformats.org/presentationml/2006/main">
+  <p:cSld>
+    <p:spTree>
+      <p:nvGrpSpPr>
+        <p:cNvPr id="1" name=""/>
+        <p:cNvGrpSpPr/>
+        <p:nvPr/>
+      </p:nvGrpSpPr>
+      <p:grpSpPr>
+        <a:xfrm>
+          <a:off x="0" y="0"/>
+          <a:ext cx="0" cy="0"/>
+          <a:chOff x="0" y="0"/>
+          <a:chExt cx="0" cy="0"/>
+        </a:xfrm>
+      </p:grpSpPr>
+      <p:sp>
+        <p:nvSpPr>
+          <p:cNvPr id="16385" name="Title 1"/>
+          <p:cNvSpPr>
+            <a:spLocks noGrp="1"/>
+          </p:cNvSpPr>
+          <p:nvPr>
+            <p:ph type="title"/>
+          </p:nvPr>
+        </p:nvSpPr>
+        <p:spPr/>
+        <p:txBody>
+          <a:bodyPr>
+            <a:normAutofit fontScale="90000"/>
+          </a:bodyPr>
+          <a:lstStyle/>
+          <a:p>
+            <a:r>
+              <a:rPr lang="en-US" b="1" dirty="0" smtClean="0"/>
+              <a:t>Square Jigsaw Puzzle Example</a:t>
+            </a:r>
+          </a:p>
+        </p:txBody>
+      </p:sp>
+      <p:sp>
+        <p:nvSpPr>
+          <p:cNvPr id="16386" name="Content Placeholder 4"/>
+          <p:cNvSpPr>
+            <a:spLocks noGrp="1"/>
+          </p:cNvSpPr>
+          <p:nvPr>
+            <p:ph idx="1"/>
+          </p:nvPr>
+        </p:nvSpPr>
+        <p:spPr/>
+        <p:txBody>
+          <a:bodyPr/>
+          <a:lstStyle/>
+          <a:p>
+            <a:endParaRPr lang="en-US" dirty="0" smtClean="0"/>
+          </a:p>
+          <a:p>
+            <a:endParaRPr lang="en-US" dirty="0" smtClean="0"/>
+          </a:p>
+          <a:p>
+            <a:endParaRPr lang="en-US" dirty="0" smtClean="0"/>
+          </a:p>
+          <a:p>
+            <a:endParaRPr lang="en-US" dirty="0" smtClean="0"/>
+          </a:p>
+          <a:p>
+            <a:endParaRPr lang="en-US" dirty="0" smtClean="0"/>
+          </a:p>
+          <a:p>
+            <a:endParaRPr lang="en-US" dirty="0" smtClean="0"/>
+          </a:p>
+          <a:p>
+            <a:endParaRPr lang="en-US" dirty="0" smtClean="0"/>
+          </a:p>
+          <a:p>
+            <a:endParaRPr lang="en-US" dirty="0" smtClean="0"/>
+          </a:p>
+          <a:p>
+            <a:r>
+              <a:rPr lang="en-US" dirty="0" smtClean="0"/>
+              <a:t>Source image (left) is divided into 81 (9x9) uniform, square patches (center).  The goal is to organize the patches to reconstruct the source image (right).</a:t>
+            </a:r>
+          </a:p>
+          <a:p>
+            <a:endParaRPr lang="en-US" dirty="0" smtClean="0"/>
+          </a:p>
+        </p:txBody>
+      </p:sp>
+      <p:pic>
+        <p:nvPicPr>
+          <p:cNvPr id="16387" name="Picture 5" descr="Jigsaw Puzzle Example.png"/>
+          <p:cNvPicPr>
+            <a:picLocks noChangeAspect="1"/>
+          </p:cNvPicPr>
+          <p:nvPr/>
+        </p:nvPicPr>
+        <p:blipFill>
+          <a:blip r:embed="rId2"/>
+          <a:srcRect/>
+          <a:stretch>
+            <a:fillRect/>
+          </a:stretch>
+        </p:blipFill>
+        <p:spPr bwMode="auto">
+          <a:xfrm>
+            <a:off x="609600" y="1676400"/>
+            <a:ext cx="7239000" cy="2471738"/>
+          </a:xfrm>
+          <a:prstGeom prst="rect">
+            <a:avLst/>
+          </a:prstGeom>
+          <a:noFill/>
+          <a:ln w="9525">
+            <a:noFill/>
+            <a:miter lim="800000"/>
+            <a:headEnd/>
+            <a:tailEnd/>
+          </a:ln>
+        </p:spPr>
+      </p:pic>
+    </p:spTree>
+  </p:cSld>
+  <p:clrMapOvr>
+    <a:masterClrMapping/>
+  </p:clrMapOvr>
+  <p:timing>
+    <p:tnLst>
+      <p:par>
+        <p:cTn id="1" dur="indefinite" restart="never" nodeType="tmRoot"/>
+      </p:par>
+    </p:tnLst>
+  </p:timing>
+</p:sld>
+</file>
+
+<file path=ppt/slides/slide30.xml><?xml version="1.0" encoding="utf-8"?>
 <p:sld xmlns:a="http://schemas.openxmlformats.org/drawingml/2006/main" xmlns:r="http://schemas.openxmlformats.org/officeDocument/2006/relationships" xmlns:p="http://schemas.openxmlformats.org/presentationml/2006/main">
   <p:cSld>
     <p:spTree>
@@ -7788,7 +10311,7 @@
 </p:sld>
 </file>
 
-<file path=ppt/slides/slide25.xml><?xml version="1.0" encoding="utf-8"?>
+<file path=ppt/slides/slide31.xml><?xml version="1.0" encoding="utf-8"?>
 <p:sld xmlns:a="http://schemas.openxmlformats.org/drawingml/2006/main" xmlns:r="http://schemas.openxmlformats.org/officeDocument/2006/relationships" xmlns:p="http://schemas.openxmlformats.org/presentationml/2006/main">
   <p:cSld>
     <p:spTree>
@@ -8667,7 +11190,7 @@
 </p:sld>
 </file>
 
-<file path=ppt/slides/slide26.xml><?xml version="1.0" encoding="utf-8"?>
+<file path=ppt/slides/slide32.xml><?xml version="1.0" encoding="utf-8"?>
 <p:sld xmlns:a="http://schemas.openxmlformats.org/drawingml/2006/main" xmlns:r="http://schemas.openxmlformats.org/officeDocument/2006/relationships" xmlns:p="http://schemas.openxmlformats.org/presentationml/2006/main">
   <p:cSld>
     <p:spTree>
@@ -9471,7 +11994,7 @@
 </p:sld>
 </file>
 
-<file path=ppt/slides/slide27.xml><?xml version="1.0" encoding="utf-8"?>
+<file path=ppt/slides/slide33.xml><?xml version="1.0" encoding="utf-8"?>
 <p:sld xmlns:a="http://schemas.openxmlformats.org/drawingml/2006/main" xmlns:r="http://schemas.openxmlformats.org/officeDocument/2006/relationships" xmlns:p="http://schemas.openxmlformats.org/presentationml/2006/main">
   <p:cSld>
     <p:spTree>
@@ -9525,14 +12048,14 @@
           <p:nvPr>
             <p:extLst>
               <p:ext uri="{D42A27DB-BD31-4B8C-83A1-F6EECF244321}">
-                <p14:modId xmlns:p14="http://schemas.microsoft.com/office/powerpoint/2010/main" val="1927998978"/>
+                <p14:modId xmlns:p14="http://schemas.microsoft.com/office/powerpoint/2010/main" val="2786423261"/>
               </p:ext>
             </p:extLst>
           </p:nvPr>
         </p:nvGraphicFramePr>
         <p:xfrm>
           <a:off x="587230" y="1006680"/>
-          <a:ext cx="8204432" cy="4534430"/>
+          <a:ext cx="8204432" cy="4754880"/>
         </p:xfrm>
         <a:graphic>
           <a:graphicData uri="http://schemas.openxmlformats.org/drawingml/2006/table">
@@ -10000,6 +12523,15 @@
                           <a:spcPts val="0"/>
                         </a:spcAft>
                       </a:pPr>
+                      <a:r>
+                        <a:rPr lang="en-US" b="0" dirty="0" smtClean="0">
+                          <a:solidFill>
+                            <a:schemeClr val="tx1"/>
+                          </a:solidFill>
+                          <a:latin typeface="+mn-lt"/>
+                        </a:rPr>
+                        <a:t>[15]</a:t>
+                      </a:r>
                       <a:endParaRPr lang="en-US" b="0" dirty="0">
                         <a:solidFill>
                           <a:schemeClr val="tx1"/>
@@ -10020,6 +12552,54 @@
                           <a:spcPts val="0"/>
                         </a:spcAft>
                       </a:pPr>
+                      <a:r>
+                        <a:rPr lang="en-US" sz="1800" b="0" i="0" kern="1200" dirty="0" err="1" smtClean="0">
+                          <a:solidFill>
+                            <a:schemeClr val="dk1"/>
+                          </a:solidFill>
+                          <a:effectLst/>
+                          <a:latin typeface="+mn-lt"/>
+                          <a:ea typeface="+mn-ea"/>
+                          <a:cs typeface="+mn-cs"/>
+                        </a:rPr>
+                        <a:t>Ioannis</a:t>
+                      </a:r>
+                      <a:r>
+                        <a:rPr lang="en-US" sz="1800" b="0" i="0" kern="1200" dirty="0" smtClean="0">
+                          <a:solidFill>
+                            <a:schemeClr val="dk1"/>
+                          </a:solidFill>
+                          <a:effectLst/>
+                          <a:latin typeface="+mn-lt"/>
+                          <a:ea typeface="+mn-ea"/>
+                          <a:cs typeface="+mn-cs"/>
+                        </a:rPr>
+                        <a:t> Pitas. 2000. </a:t>
+                      </a:r>
+                      <a:r>
+                        <a:rPr lang="en-US" sz="1800" b="0" i="1" kern="1200" dirty="0" smtClean="0">
+                          <a:solidFill>
+                            <a:schemeClr val="dk1"/>
+                          </a:solidFill>
+                          <a:effectLst/>
+                          <a:latin typeface="+mn-lt"/>
+                          <a:ea typeface="+mn-ea"/>
+                          <a:cs typeface="+mn-cs"/>
+                        </a:rPr>
+                        <a:t>Digital Image Processing Algorithms and Applications</a:t>
+                      </a:r>
+                      <a:r>
+                        <a:rPr lang="en-US" sz="1800" b="0" i="0" kern="1200" dirty="0" smtClean="0">
+                          <a:solidFill>
+                            <a:schemeClr val="dk1"/>
+                          </a:solidFill>
+                          <a:effectLst/>
+                          <a:latin typeface="+mn-lt"/>
+                          <a:ea typeface="+mn-ea"/>
+                          <a:cs typeface="+mn-cs"/>
+                        </a:rPr>
+                        <a:t> (1st ed.). John Wiley &amp; Sons, Inc., New York, NY, USA.</a:t>
+                      </a:r>
                       <a:endParaRPr lang="en-US" sz="1800" b="0" dirty="0">
                         <a:solidFill>
                           <a:schemeClr val="tx1"/>
@@ -10041,143 +12621,6 @@
         <p14:creationId xmlns:p14="http://schemas.microsoft.com/office/powerpoint/2010/main" val="3645381260"/>
       </p:ext>
     </p:extLst>
-  </p:cSld>
-  <p:clrMapOvr>
-    <a:masterClrMapping/>
-  </p:clrMapOvr>
-  <p:timing>
-    <p:tnLst>
-      <p:par>
-        <p:cTn id="1" dur="indefinite" restart="never" nodeType="tmRoot"/>
-      </p:par>
-    </p:tnLst>
-  </p:timing>
-</p:sld>
-</file>
-
-<file path=ppt/slides/slide3.xml><?xml version="1.0" encoding="utf-8"?>
-<p:sld xmlns:a="http://schemas.openxmlformats.org/drawingml/2006/main" xmlns:r="http://schemas.openxmlformats.org/officeDocument/2006/relationships" xmlns:p="http://schemas.openxmlformats.org/presentationml/2006/main">
-  <p:cSld>
-    <p:spTree>
-      <p:nvGrpSpPr>
-        <p:cNvPr id="1" name=""/>
-        <p:cNvGrpSpPr/>
-        <p:nvPr/>
-      </p:nvGrpSpPr>
-      <p:grpSpPr>
-        <a:xfrm>
-          <a:off x="0" y="0"/>
-          <a:ext cx="0" cy="0"/>
-          <a:chOff x="0" y="0"/>
-          <a:chExt cx="0" cy="0"/>
-        </a:xfrm>
-      </p:grpSpPr>
-      <p:sp>
-        <p:nvSpPr>
-          <p:cNvPr id="16385" name="Title 1"/>
-          <p:cNvSpPr>
-            <a:spLocks noGrp="1"/>
-          </p:cNvSpPr>
-          <p:nvPr>
-            <p:ph type="title"/>
-          </p:nvPr>
-        </p:nvSpPr>
-        <p:spPr/>
-        <p:txBody>
-          <a:bodyPr>
-            <a:normAutofit fontScale="90000"/>
-          </a:bodyPr>
-          <a:lstStyle/>
-          <a:p>
-            <a:r>
-              <a:rPr lang="en-US" b="1" dirty="0" smtClean="0"/>
-              <a:t>Square Jigsaw Puzzle Example</a:t>
-            </a:r>
-          </a:p>
-        </p:txBody>
-      </p:sp>
-      <p:sp>
-        <p:nvSpPr>
-          <p:cNvPr id="16386" name="Content Placeholder 4"/>
-          <p:cNvSpPr>
-            <a:spLocks noGrp="1"/>
-          </p:cNvSpPr>
-          <p:nvPr>
-            <p:ph idx="1"/>
-          </p:nvPr>
-        </p:nvSpPr>
-        <p:spPr/>
-        <p:txBody>
-          <a:bodyPr/>
-          <a:lstStyle/>
-          <a:p>
-            <a:endParaRPr lang="en-US" dirty="0" smtClean="0"/>
-          </a:p>
-          <a:p>
-            <a:endParaRPr lang="en-US" dirty="0" smtClean="0"/>
-          </a:p>
-          <a:p>
-            <a:endParaRPr lang="en-US" dirty="0" smtClean="0"/>
-          </a:p>
-          <a:p>
-            <a:endParaRPr lang="en-US" dirty="0" smtClean="0"/>
-          </a:p>
-          <a:p>
-            <a:endParaRPr lang="en-US" dirty="0" smtClean="0"/>
-          </a:p>
-          <a:p>
-            <a:endParaRPr lang="en-US" dirty="0" smtClean="0"/>
-          </a:p>
-          <a:p>
-            <a:endParaRPr lang="en-US" dirty="0" smtClean="0"/>
-          </a:p>
-          <a:p>
-            <a:endParaRPr lang="en-US" dirty="0" smtClean="0"/>
-          </a:p>
-          <a:p>
-            <a:r>
-              <a:rPr lang="en-US" dirty="0" smtClean="0"/>
-              <a:t>Source image (left) is divided into 81 (9x9) uniform, square patches (center).  The goal is to organize the patches to reconstruct the source image (right).</a:t>
-            </a:r>
-          </a:p>
-          <a:p>
-            <a:endParaRPr lang="en-US" dirty="0" smtClean="0"/>
-          </a:p>
-        </p:txBody>
-      </p:sp>
-      <p:pic>
-        <p:nvPicPr>
-          <p:cNvPr id="16387" name="Picture 5" descr="Jigsaw Puzzle Example.png"/>
-          <p:cNvPicPr>
-            <a:picLocks noChangeAspect="1"/>
-          </p:cNvPicPr>
-          <p:nvPr/>
-        </p:nvPicPr>
-        <p:blipFill>
-          <a:blip r:embed="rId2"/>
-          <a:srcRect/>
-          <a:stretch>
-            <a:fillRect/>
-          </a:stretch>
-        </p:blipFill>
-        <p:spPr bwMode="auto">
-          <a:xfrm>
-            <a:off x="609600" y="1676400"/>
-            <a:ext cx="7239000" cy="2471738"/>
-          </a:xfrm>
-          <a:prstGeom prst="rect">
-            <a:avLst/>
-          </a:prstGeom>
-          <a:noFill/>
-          <a:ln w="9525">
-            <a:noFill/>
-            <a:miter lim="800000"/>
-            <a:headEnd/>
-            <a:tailEnd/>
-          </a:ln>
-        </p:spPr>
-      </p:pic>
-    </p:spTree>
   </p:cSld>
   <p:clrMapOvr>
     <a:masterClrMapping/>
@@ -11716,7 +14159,7 @@
             <p:spPr/>
             <p:txBody>
               <a:bodyPr>
-                <a:normAutofit/>
+                <a:normAutofit lnSpcReduction="10000"/>
               </a:bodyPr>
               <a:lstStyle/>
               <a:p>
@@ -11781,6 +14224,17 @@
                   <a:rPr lang="en-US" dirty="0" smtClean="0"/>
                   <a:t> norm.</a:t>
                 </a:r>
+              </a:p>
+              <a:p>
+                <a:pPr>
+                  <a:lnSpc>
+                    <a:spcPct val="120000"/>
+                  </a:lnSpc>
+                  <a:spcBef>
+                    <a:spcPts val="600"/>
+                  </a:spcBef>
+                </a:pPr>
+                <a:endParaRPr lang="en-US" sz="400" dirty="0" smtClean="0"/>
               </a:p>
               <a:p>
                 <a:pPr marL="0" indent="0">
@@ -12353,7 +14807,7 @@
               <a:blipFill rotWithShape="1">
                 <a:blip r:embed="rId3"/>
                 <a:stretch>
-                  <a:fillRect l="-963" t="-119" b="-119"/>
+                  <a:fillRect l="-963" t="-593"/>
                 </a:stretch>
               </a:blipFill>
             </p:spPr>

</xml_diff>